<commit_message>
Added PDFs and minor update to include DNS as likely external traffic
</commit_message>
<xml_diff>
--- a/Packet_Analysis_Reference.pptx
+++ b/Packet_Analysis_Reference.pptx
@@ -204,1237 +204,42 @@
 <file path=ppt/changesInfos/changesInfo1.xml><?xml version="1.0" encoding="utf-8"?>
 <pc:chgInfo xmlns:a="http://schemas.openxmlformats.org/drawingml/2006/main" xmlns:r="http://schemas.openxmlformats.org/officeDocument/2006/relationships" xmlns:ac="http://schemas.microsoft.com/office/drawing/2013/main/command" xmlns:pc="http://schemas.microsoft.com/office/powerpoint/2013/main/command">
   <pc:docChgLst>
+    <pc:chgData name="Stephen Deck" userId="d0abce2a322c43a5" providerId="LiveId" clId="{D07CAAE1-EC91-4D3F-894A-04A870293963}"/>
+    <pc:docChg chg="custSel modSld">
+      <pc:chgData name="Stephen Deck" userId="d0abce2a322c43a5" providerId="LiveId" clId="{D07CAAE1-EC91-4D3F-894A-04A870293963}" dt="2018-04-23T12:36:52.574" v="70" actId="20577"/>
+      <pc:docMkLst>
+        <pc:docMk/>
+      </pc:docMkLst>
+      <pc:sldChg chg="modSp">
+        <pc:chgData name="Stephen Deck" userId="d0abce2a322c43a5" providerId="LiveId" clId="{D07CAAE1-EC91-4D3F-894A-04A870293963}" dt="2018-04-23T12:36:52.574" v="70" actId="20577"/>
+        <pc:sldMkLst>
+          <pc:docMk/>
+          <pc:sldMk cId="765347730" sldId="423"/>
+        </pc:sldMkLst>
+        <pc:spChg chg="mod">
+          <ac:chgData name="Stephen Deck" userId="d0abce2a322c43a5" providerId="LiveId" clId="{D07CAAE1-EC91-4D3F-894A-04A870293963}" dt="2018-04-23T12:36:52.574" v="70" actId="20577"/>
+          <ac:spMkLst>
+            <pc:docMk/>
+            <pc:sldMk cId="765347730" sldId="423"/>
+            <ac:spMk id="11" creationId="{CF03DFB5-5A8F-427E-98CE-C343A2ACF58A}"/>
+          </ac:spMkLst>
+        </pc:spChg>
+      </pc:sldChg>
+    </pc:docChg>
+  </pc:docChgLst>
+  <pc:docChgLst>
     <pc:chgData name="Stephen Deck" userId="d0abce2a322c43a5" providerId="LiveId" clId="{ADFD2B2D-6693-472B-9AA3-4F1E67DE2D0B}"/>
     <pc:docChg chg="delSld modSection">
       <pc:chgData name="Stephen Deck" userId="d0abce2a322c43a5" providerId="LiveId" clId="{ADFD2B2D-6693-472B-9AA3-4F1E67DE2D0B}" dt="2018-04-21T12:55:58.489" v="173" actId="2696"/>
       <pc:docMkLst>
         <pc:docMk/>
       </pc:docMkLst>
-      <pc:sldChg chg="del">
-        <pc:chgData name="Stephen Deck" userId="d0abce2a322c43a5" providerId="LiveId" clId="{ADFD2B2D-6693-472B-9AA3-4F1E67DE2D0B}" dt="2018-04-21T12:16:21.864" v="0" actId="2696"/>
-        <pc:sldMkLst>
-          <pc:docMk/>
-          <pc:sldMk cId="1572080917" sldId="257"/>
-        </pc:sldMkLst>
-      </pc:sldChg>
-      <pc:sldChg chg="del">
-        <pc:chgData name="Stephen Deck" userId="d0abce2a322c43a5" providerId="LiveId" clId="{ADFD2B2D-6693-472B-9AA3-4F1E67DE2D0B}" dt="2018-04-21T12:16:21.995" v="3" actId="2696"/>
-        <pc:sldMkLst>
-          <pc:docMk/>
-          <pc:sldMk cId="165294115" sldId="260"/>
-        </pc:sldMkLst>
-      </pc:sldChg>
-      <pc:sldChg chg="del">
-        <pc:chgData name="Stephen Deck" userId="d0abce2a322c43a5" providerId="LiveId" clId="{ADFD2B2D-6693-472B-9AA3-4F1E67DE2D0B}" dt="2018-04-21T12:55:58.489" v="173" actId="2696"/>
-        <pc:sldMkLst>
-          <pc:docMk/>
-          <pc:sldMk cId="378311860" sldId="266"/>
-        </pc:sldMkLst>
-      </pc:sldChg>
-      <pc:sldChg chg="del">
-        <pc:chgData name="Stephen Deck" userId="d0abce2a322c43a5" providerId="LiveId" clId="{ADFD2B2D-6693-472B-9AA3-4F1E67DE2D0B}" dt="2018-04-21T12:23:59.044" v="101" actId="2696"/>
-        <pc:sldMkLst>
-          <pc:docMk/>
-          <pc:sldMk cId="1335843847" sldId="271"/>
-        </pc:sldMkLst>
-      </pc:sldChg>
-      <pc:sldChg chg="del">
-        <pc:chgData name="Stephen Deck" userId="d0abce2a322c43a5" providerId="LiveId" clId="{ADFD2B2D-6693-472B-9AA3-4F1E67DE2D0B}" dt="2018-04-21T12:17:34.410" v="44" actId="2696"/>
-        <pc:sldMkLst>
-          <pc:docMk/>
-          <pc:sldMk cId="3003349192" sldId="272"/>
-        </pc:sldMkLst>
-      </pc:sldChg>
-      <pc:sldChg chg="del">
-        <pc:chgData name="Stephen Deck" userId="d0abce2a322c43a5" providerId="LiveId" clId="{ADFD2B2D-6693-472B-9AA3-4F1E67DE2D0B}" dt="2018-04-21T12:16:21.897" v="1" actId="2696"/>
-        <pc:sldMkLst>
-          <pc:docMk/>
-          <pc:sldMk cId="2863405215" sldId="273"/>
-        </pc:sldMkLst>
-      </pc:sldChg>
-      <pc:sldChg chg="del">
-        <pc:chgData name="Stephen Deck" userId="d0abce2a322c43a5" providerId="LiveId" clId="{ADFD2B2D-6693-472B-9AA3-4F1E67DE2D0B}" dt="2018-04-21T12:16:21.939" v="2" actId="2696"/>
-        <pc:sldMkLst>
-          <pc:docMk/>
-          <pc:sldMk cId="3870661452" sldId="274"/>
-        </pc:sldMkLst>
-      </pc:sldChg>
-      <pc:sldChg chg="del">
-        <pc:chgData name="Stephen Deck" userId="d0abce2a322c43a5" providerId="LiveId" clId="{ADFD2B2D-6693-472B-9AA3-4F1E67DE2D0B}" dt="2018-04-21T12:17:34.363" v="43" actId="2696"/>
-        <pc:sldMkLst>
-          <pc:docMk/>
-          <pc:sldMk cId="1027322276" sldId="275"/>
-        </pc:sldMkLst>
-      </pc:sldChg>
-      <pc:sldChg chg="del">
-        <pc:chgData name="Stephen Deck" userId="d0abce2a322c43a5" providerId="LiveId" clId="{ADFD2B2D-6693-472B-9AA3-4F1E67DE2D0B}" dt="2018-04-21T12:23:59.007" v="100" actId="2696"/>
-        <pc:sldMkLst>
-          <pc:docMk/>
-          <pc:sldMk cId="2614892075" sldId="276"/>
-        </pc:sldMkLst>
-      </pc:sldChg>
-      <pc:sldChg chg="del">
-        <pc:chgData name="Stephen Deck" userId="d0abce2a322c43a5" providerId="LiveId" clId="{ADFD2B2D-6693-472B-9AA3-4F1E67DE2D0B}" dt="2018-04-21T12:16:22.111" v="5" actId="2696"/>
-        <pc:sldMkLst>
-          <pc:docMk/>
-          <pc:sldMk cId="2050610575" sldId="278"/>
-        </pc:sldMkLst>
-      </pc:sldChg>
-      <pc:sldChg chg="del">
-        <pc:chgData name="Stephen Deck" userId="d0abce2a322c43a5" providerId="LiveId" clId="{ADFD2B2D-6693-472B-9AA3-4F1E67DE2D0B}" dt="2018-04-21T12:16:27.633" v="8" actId="2696"/>
-        <pc:sldMkLst>
-          <pc:docMk/>
-          <pc:sldMk cId="3167373508" sldId="279"/>
-        </pc:sldMkLst>
-      </pc:sldChg>
-      <pc:sldChg chg="del">
-        <pc:chgData name="Stephen Deck" userId="d0abce2a322c43a5" providerId="LiveId" clId="{ADFD2B2D-6693-472B-9AA3-4F1E67DE2D0B}" dt="2018-04-21T12:16:32.833" v="9" actId="2696"/>
-        <pc:sldMkLst>
-          <pc:docMk/>
-          <pc:sldMk cId="2767271775" sldId="281"/>
-        </pc:sldMkLst>
-      </pc:sldChg>
-      <pc:sldChg chg="del">
-        <pc:chgData name="Stephen Deck" userId="d0abce2a322c43a5" providerId="LiveId" clId="{ADFD2B2D-6693-472B-9AA3-4F1E67DE2D0B}" dt="2018-04-21T12:16:27.578" v="7" actId="2696"/>
-        <pc:sldMkLst>
-          <pc:docMk/>
-          <pc:sldMk cId="2569779248" sldId="283"/>
-        </pc:sldMkLst>
-      </pc:sldChg>
-      <pc:sldChg chg="del">
-        <pc:chgData name="Stephen Deck" userId="d0abce2a322c43a5" providerId="LiveId" clId="{ADFD2B2D-6693-472B-9AA3-4F1E67DE2D0B}" dt="2018-04-21T12:16:32.879" v="10" actId="2696"/>
-        <pc:sldMkLst>
-          <pc:docMk/>
-          <pc:sldMk cId="211525463" sldId="284"/>
-        </pc:sldMkLst>
-      </pc:sldChg>
-      <pc:sldChg chg="del">
-        <pc:chgData name="Stephen Deck" userId="d0abce2a322c43a5" providerId="LiveId" clId="{ADFD2B2D-6693-472B-9AA3-4F1E67DE2D0B}" dt="2018-04-21T12:16:32.924" v="11" actId="2696"/>
-        <pc:sldMkLst>
-          <pc:docMk/>
-          <pc:sldMk cId="2824500291" sldId="285"/>
-        </pc:sldMkLst>
-      </pc:sldChg>
-      <pc:sldChg chg="del">
-        <pc:chgData name="Stephen Deck" userId="d0abce2a322c43a5" providerId="LiveId" clId="{ADFD2B2D-6693-472B-9AA3-4F1E67DE2D0B}" dt="2018-04-21T12:16:32.999" v="12" actId="2696"/>
-        <pc:sldMkLst>
-          <pc:docMk/>
-          <pc:sldMk cId="3681746238" sldId="286"/>
-        </pc:sldMkLst>
-      </pc:sldChg>
-      <pc:sldChg chg="del">
-        <pc:chgData name="Stephen Deck" userId="d0abce2a322c43a5" providerId="LiveId" clId="{ADFD2B2D-6693-472B-9AA3-4F1E67DE2D0B}" dt="2018-04-21T12:16:42.966" v="15" actId="2696"/>
-        <pc:sldMkLst>
-          <pc:docMk/>
-          <pc:sldMk cId="3779883294" sldId="287"/>
-        </pc:sldMkLst>
-      </pc:sldChg>
-      <pc:sldChg chg="del">
-        <pc:chgData name="Stephen Deck" userId="d0abce2a322c43a5" providerId="LiveId" clId="{ADFD2B2D-6693-472B-9AA3-4F1E67DE2D0B}" dt="2018-04-21T12:16:42.876" v="13" actId="2696"/>
-        <pc:sldMkLst>
-          <pc:docMk/>
-          <pc:sldMk cId="1993731998" sldId="288"/>
-        </pc:sldMkLst>
-      </pc:sldChg>
-      <pc:sldChg chg="del">
-        <pc:chgData name="Stephen Deck" userId="d0abce2a322c43a5" providerId="LiveId" clId="{ADFD2B2D-6693-472B-9AA3-4F1E67DE2D0B}" dt="2018-04-21T12:16:42.924" v="14" actId="2696"/>
-        <pc:sldMkLst>
-          <pc:docMk/>
-          <pc:sldMk cId="3479895894" sldId="290"/>
-        </pc:sldMkLst>
-      </pc:sldChg>
-      <pc:sldChg chg="del">
-        <pc:chgData name="Stephen Deck" userId="d0abce2a322c43a5" providerId="LiveId" clId="{ADFD2B2D-6693-472B-9AA3-4F1E67DE2D0B}" dt="2018-04-21T12:16:43.012" v="16" actId="2696"/>
-        <pc:sldMkLst>
-          <pc:docMk/>
-          <pc:sldMk cId="2833572157" sldId="291"/>
-        </pc:sldMkLst>
-      </pc:sldChg>
-      <pc:sldChg chg="del">
-        <pc:chgData name="Stephen Deck" userId="d0abce2a322c43a5" providerId="LiveId" clId="{ADFD2B2D-6693-472B-9AA3-4F1E67DE2D0B}" dt="2018-04-21T12:16:43.065" v="17" actId="2696"/>
-        <pc:sldMkLst>
-          <pc:docMk/>
-          <pc:sldMk cId="2639511707" sldId="292"/>
-        </pc:sldMkLst>
-      </pc:sldChg>
-      <pc:sldChg chg="del">
-        <pc:chgData name="Stephen Deck" userId="d0abce2a322c43a5" providerId="LiveId" clId="{ADFD2B2D-6693-472B-9AA3-4F1E67DE2D0B}" dt="2018-04-21T12:16:43.103" v="18" actId="2696"/>
-        <pc:sldMkLst>
-          <pc:docMk/>
-          <pc:sldMk cId="1817222083" sldId="293"/>
-        </pc:sldMkLst>
-      </pc:sldChg>
-      <pc:sldChg chg="del">
-        <pc:chgData name="Stephen Deck" userId="d0abce2a322c43a5" providerId="LiveId" clId="{ADFD2B2D-6693-472B-9AA3-4F1E67DE2D0B}" dt="2018-04-21T12:16:55.033" v="27" actId="2696"/>
-        <pc:sldMkLst>
-          <pc:docMk/>
-          <pc:sldMk cId="2980388268" sldId="295"/>
-        </pc:sldMkLst>
-      </pc:sldChg>
-      <pc:sldChg chg="del">
-        <pc:chgData name="Stephen Deck" userId="d0abce2a322c43a5" providerId="LiveId" clId="{ADFD2B2D-6693-472B-9AA3-4F1E67DE2D0B}" dt="2018-04-21T12:16:45.947" v="19" actId="2696"/>
-        <pc:sldMkLst>
-          <pc:docMk/>
-          <pc:sldMk cId="33891465" sldId="297"/>
-        </pc:sldMkLst>
-      </pc:sldChg>
-      <pc:sldChg chg="del">
-        <pc:chgData name="Stephen Deck" userId="d0abce2a322c43a5" providerId="LiveId" clId="{ADFD2B2D-6693-472B-9AA3-4F1E67DE2D0B}" dt="2018-04-21T12:16:55.069" v="28" actId="2696"/>
-        <pc:sldMkLst>
-          <pc:docMk/>
-          <pc:sldMk cId="2403198923" sldId="298"/>
-        </pc:sldMkLst>
-      </pc:sldChg>
-      <pc:sldChg chg="del">
-        <pc:chgData name="Stephen Deck" userId="d0abce2a322c43a5" providerId="LiveId" clId="{ADFD2B2D-6693-472B-9AA3-4F1E67DE2D0B}" dt="2018-04-21T12:17:01.906" v="36" actId="2696"/>
-        <pc:sldMkLst>
-          <pc:docMk/>
-          <pc:sldMk cId="4003284301" sldId="299"/>
-        </pc:sldMkLst>
-      </pc:sldChg>
-      <pc:sldChg chg="del">
-        <pc:chgData name="Stephen Deck" userId="d0abce2a322c43a5" providerId="LiveId" clId="{ADFD2B2D-6693-472B-9AA3-4F1E67DE2D0B}" dt="2018-04-21T12:17:04.827" v="37" actId="2696"/>
-        <pc:sldMkLst>
-          <pc:docMk/>
-          <pc:sldMk cId="1957513323" sldId="300"/>
-        </pc:sldMkLst>
-      </pc:sldChg>
-      <pc:sldChg chg="del">
-        <pc:chgData name="Stephen Deck" userId="d0abce2a322c43a5" providerId="LiveId" clId="{ADFD2B2D-6693-472B-9AA3-4F1E67DE2D0B}" dt="2018-04-21T12:17:22.458" v="40" actId="2696"/>
-        <pc:sldMkLst>
-          <pc:docMk/>
-          <pc:sldMk cId="1226059620" sldId="301"/>
-        </pc:sldMkLst>
-      </pc:sldChg>
-      <pc:sldChg chg="del">
-        <pc:chgData name="Stephen Deck" userId="d0abce2a322c43a5" providerId="LiveId" clId="{ADFD2B2D-6693-472B-9AA3-4F1E67DE2D0B}" dt="2018-04-21T12:16:27.526" v="6" actId="2696"/>
-        <pc:sldMkLst>
-          <pc:docMk/>
-          <pc:sldMk cId="1265854071" sldId="303"/>
-        </pc:sldMkLst>
-      </pc:sldChg>
-      <pc:sldChg chg="del">
-        <pc:chgData name="Stephen Deck" userId="d0abce2a322c43a5" providerId="LiveId" clId="{ADFD2B2D-6693-472B-9AA3-4F1E67DE2D0B}" dt="2018-04-21T12:16:22.050" v="4" actId="2696"/>
-        <pc:sldMkLst>
-          <pc:docMk/>
-          <pc:sldMk cId="3291766465" sldId="304"/>
-        </pc:sldMkLst>
-      </pc:sldChg>
-      <pc:sldChg chg="del">
-        <pc:chgData name="Stephen Deck" userId="d0abce2a322c43a5" providerId="LiveId" clId="{ADFD2B2D-6693-472B-9AA3-4F1E67DE2D0B}" dt="2018-04-21T12:17:01.587" v="29" actId="2696"/>
-        <pc:sldMkLst>
-          <pc:docMk/>
-          <pc:sldMk cId="1340069480" sldId="307"/>
-        </pc:sldMkLst>
-      </pc:sldChg>
-      <pc:sldChg chg="del">
-        <pc:chgData name="Stephen Deck" userId="d0abce2a322c43a5" providerId="LiveId" clId="{ADFD2B2D-6693-472B-9AA3-4F1E67DE2D0B}" dt="2018-04-21T12:17:01.632" v="30" actId="2696"/>
-        <pc:sldMkLst>
-          <pc:docMk/>
-          <pc:sldMk cId="3214217323" sldId="308"/>
-        </pc:sldMkLst>
-      </pc:sldChg>
-      <pc:sldChg chg="del">
-        <pc:chgData name="Stephen Deck" userId="d0abce2a322c43a5" providerId="LiveId" clId="{ADFD2B2D-6693-472B-9AA3-4F1E67DE2D0B}" dt="2018-04-21T12:17:34.456" v="45" actId="2696"/>
-        <pc:sldMkLst>
-          <pc:docMk/>
-          <pc:sldMk cId="3106833495" sldId="311"/>
-        </pc:sldMkLst>
-      </pc:sldChg>
-      <pc:sldChg chg="del">
-        <pc:chgData name="Stephen Deck" userId="d0abce2a322c43a5" providerId="LiveId" clId="{ADFD2B2D-6693-472B-9AA3-4F1E67DE2D0B}" dt="2018-04-21T12:17:34.551" v="47" actId="2696"/>
-        <pc:sldMkLst>
-          <pc:docMk/>
-          <pc:sldMk cId="471882139" sldId="312"/>
-        </pc:sldMkLst>
-      </pc:sldChg>
-      <pc:sldChg chg="del">
-        <pc:chgData name="Stephen Deck" userId="d0abce2a322c43a5" providerId="LiveId" clId="{ADFD2B2D-6693-472B-9AA3-4F1E67DE2D0B}" dt="2018-04-21T12:17:34.502" v="46" actId="2696"/>
-        <pc:sldMkLst>
-          <pc:docMk/>
-          <pc:sldMk cId="4018591003" sldId="313"/>
-        </pc:sldMkLst>
-      </pc:sldChg>
-      <pc:sldChg chg="del">
-        <pc:chgData name="Stephen Deck" userId="d0abce2a322c43a5" providerId="LiveId" clId="{ADFD2B2D-6693-472B-9AA3-4F1E67DE2D0B}" dt="2018-04-21T12:17:34.597" v="48" actId="2696"/>
-        <pc:sldMkLst>
-          <pc:docMk/>
-          <pc:sldMk cId="833029415" sldId="314"/>
-        </pc:sldMkLst>
-      </pc:sldChg>
-      <pc:sldChg chg="del">
-        <pc:chgData name="Stephen Deck" userId="d0abce2a322c43a5" providerId="LiveId" clId="{ADFD2B2D-6693-472B-9AA3-4F1E67DE2D0B}" dt="2018-04-21T12:17:34.641" v="49" actId="2696"/>
-        <pc:sldMkLst>
-          <pc:docMk/>
-          <pc:sldMk cId="1889074522" sldId="315"/>
-        </pc:sldMkLst>
-      </pc:sldChg>
-      <pc:sldChg chg="del">
-        <pc:chgData name="Stephen Deck" userId="d0abce2a322c43a5" providerId="LiveId" clId="{ADFD2B2D-6693-472B-9AA3-4F1E67DE2D0B}" dt="2018-04-21T12:17:34.690" v="50" actId="2696"/>
-        <pc:sldMkLst>
-          <pc:docMk/>
-          <pc:sldMk cId="3804453732" sldId="316"/>
-        </pc:sldMkLst>
-      </pc:sldChg>
-      <pc:sldChg chg="del">
-        <pc:chgData name="Stephen Deck" userId="d0abce2a322c43a5" providerId="LiveId" clId="{ADFD2B2D-6693-472B-9AA3-4F1E67DE2D0B}" dt="2018-04-21T12:17:34.736" v="51" actId="2696"/>
-        <pc:sldMkLst>
-          <pc:docMk/>
-          <pc:sldMk cId="3449299165" sldId="317"/>
-        </pc:sldMkLst>
-      </pc:sldChg>
-      <pc:sldChg chg="del">
-        <pc:chgData name="Stephen Deck" userId="d0abce2a322c43a5" providerId="LiveId" clId="{ADFD2B2D-6693-472B-9AA3-4F1E67DE2D0B}" dt="2018-04-21T12:18:06.129" v="52" actId="2696"/>
-        <pc:sldMkLst>
-          <pc:docMk/>
-          <pc:sldMk cId="3525014666" sldId="318"/>
-        </pc:sldMkLst>
-      </pc:sldChg>
-      <pc:sldChg chg="del">
-        <pc:chgData name="Stephen Deck" userId="d0abce2a322c43a5" providerId="LiveId" clId="{ADFD2B2D-6693-472B-9AA3-4F1E67DE2D0B}" dt="2018-04-21T12:18:06.172" v="53" actId="2696"/>
-        <pc:sldMkLst>
-          <pc:docMk/>
-          <pc:sldMk cId="626672928" sldId="319"/>
-        </pc:sldMkLst>
-      </pc:sldChg>
-      <pc:sldChg chg="del">
-        <pc:chgData name="Stephen Deck" userId="d0abce2a322c43a5" providerId="LiveId" clId="{ADFD2B2D-6693-472B-9AA3-4F1E67DE2D0B}" dt="2018-04-21T12:18:06.232" v="54" actId="2696"/>
-        <pc:sldMkLst>
-          <pc:docMk/>
-          <pc:sldMk cId="562224854" sldId="320"/>
-        </pc:sldMkLst>
-      </pc:sldChg>
-      <pc:sldChg chg="del">
-        <pc:chgData name="Stephen Deck" userId="d0abce2a322c43a5" providerId="LiveId" clId="{ADFD2B2D-6693-472B-9AA3-4F1E67DE2D0B}" dt="2018-04-21T12:18:06.284" v="55" actId="2696"/>
-        <pc:sldMkLst>
-          <pc:docMk/>
-          <pc:sldMk cId="1998398562" sldId="322"/>
-        </pc:sldMkLst>
-      </pc:sldChg>
-      <pc:sldChg chg="del">
-        <pc:chgData name="Stephen Deck" userId="d0abce2a322c43a5" providerId="LiveId" clId="{ADFD2B2D-6693-472B-9AA3-4F1E67DE2D0B}" dt="2018-04-21T12:18:06.341" v="56" actId="2696"/>
-        <pc:sldMkLst>
-          <pc:docMk/>
-          <pc:sldMk cId="810221071" sldId="323"/>
-        </pc:sldMkLst>
-      </pc:sldChg>
-      <pc:sldChg chg="del">
-        <pc:chgData name="Stephen Deck" userId="d0abce2a322c43a5" providerId="LiveId" clId="{ADFD2B2D-6693-472B-9AA3-4F1E67DE2D0B}" dt="2018-04-21T12:18:06.426" v="58" actId="2696"/>
-        <pc:sldMkLst>
-          <pc:docMk/>
-          <pc:sldMk cId="2930923852" sldId="325"/>
-        </pc:sldMkLst>
-      </pc:sldChg>
-      <pc:sldChg chg="del">
-        <pc:chgData name="Stephen Deck" userId="d0abce2a322c43a5" providerId="LiveId" clId="{ADFD2B2D-6693-472B-9AA3-4F1E67DE2D0B}" dt="2018-04-21T12:18:06.466" v="59" actId="2696"/>
-        <pc:sldMkLst>
-          <pc:docMk/>
-          <pc:sldMk cId="1806039039" sldId="326"/>
-        </pc:sldMkLst>
-      </pc:sldChg>
-      <pc:sldChg chg="del">
-        <pc:chgData name="Stephen Deck" userId="d0abce2a322c43a5" providerId="LiveId" clId="{ADFD2B2D-6693-472B-9AA3-4F1E67DE2D0B}" dt="2018-04-21T12:18:06.517" v="60" actId="2696"/>
-        <pc:sldMkLst>
-          <pc:docMk/>
-          <pc:sldMk cId="3245239115" sldId="327"/>
-        </pc:sldMkLst>
-      </pc:sldChg>
-      <pc:sldChg chg="del">
-        <pc:chgData name="Stephen Deck" userId="d0abce2a322c43a5" providerId="LiveId" clId="{ADFD2B2D-6693-472B-9AA3-4F1E67DE2D0B}" dt="2018-04-21T12:18:06.561" v="61" actId="2696"/>
-        <pc:sldMkLst>
-          <pc:docMk/>
-          <pc:sldMk cId="3846621009" sldId="328"/>
-        </pc:sldMkLst>
-      </pc:sldChg>
-      <pc:sldChg chg="del">
-        <pc:chgData name="Stephen Deck" userId="d0abce2a322c43a5" providerId="LiveId" clId="{ADFD2B2D-6693-472B-9AA3-4F1E67DE2D0B}" dt="2018-04-21T12:18:06.643" v="63" actId="2696"/>
-        <pc:sldMkLst>
-          <pc:docMk/>
-          <pc:sldMk cId="916098536" sldId="329"/>
-        </pc:sldMkLst>
-      </pc:sldChg>
-      <pc:sldChg chg="del">
-        <pc:chgData name="Stephen Deck" userId="d0abce2a322c43a5" providerId="LiveId" clId="{ADFD2B2D-6693-472B-9AA3-4F1E67DE2D0B}" dt="2018-04-21T12:18:06.605" v="62" actId="2696"/>
-        <pc:sldMkLst>
-          <pc:docMk/>
-          <pc:sldMk cId="256762286" sldId="331"/>
-        </pc:sldMkLst>
-      </pc:sldChg>
-      <pc:sldChg chg="del">
-        <pc:chgData name="Stephen Deck" userId="d0abce2a322c43a5" providerId="LiveId" clId="{ADFD2B2D-6693-472B-9AA3-4F1E67DE2D0B}" dt="2018-04-21T12:18:06.683" v="64" actId="2696"/>
-        <pc:sldMkLst>
-          <pc:docMk/>
-          <pc:sldMk cId="1541459879" sldId="332"/>
-        </pc:sldMkLst>
-      </pc:sldChg>
-      <pc:sldChg chg="del">
-        <pc:chgData name="Stephen Deck" userId="d0abce2a322c43a5" providerId="LiveId" clId="{ADFD2B2D-6693-472B-9AA3-4F1E67DE2D0B}" dt="2018-04-21T12:18:06.732" v="65" actId="2696"/>
-        <pc:sldMkLst>
-          <pc:docMk/>
-          <pc:sldMk cId="1541239710" sldId="333"/>
-        </pc:sldMkLst>
-      </pc:sldChg>
-      <pc:sldChg chg="del">
-        <pc:chgData name="Stephen Deck" userId="d0abce2a322c43a5" providerId="LiveId" clId="{ADFD2B2D-6693-472B-9AA3-4F1E67DE2D0B}" dt="2018-04-21T12:18:06.771" v="66" actId="2696"/>
-        <pc:sldMkLst>
-          <pc:docMk/>
-          <pc:sldMk cId="323435294" sldId="334"/>
-        </pc:sldMkLst>
-      </pc:sldChg>
-      <pc:sldChg chg="del">
-        <pc:chgData name="Stephen Deck" userId="d0abce2a322c43a5" providerId="LiveId" clId="{ADFD2B2D-6693-472B-9AA3-4F1E67DE2D0B}" dt="2018-04-21T12:18:06.815" v="67" actId="2696"/>
-        <pc:sldMkLst>
-          <pc:docMk/>
-          <pc:sldMk cId="2348179689" sldId="335"/>
-        </pc:sldMkLst>
-      </pc:sldChg>
-      <pc:sldChg chg="del">
-        <pc:chgData name="Stephen Deck" userId="d0abce2a322c43a5" providerId="LiveId" clId="{ADFD2B2D-6693-472B-9AA3-4F1E67DE2D0B}" dt="2018-04-21T12:18:06.866" v="68" actId="2696"/>
-        <pc:sldMkLst>
-          <pc:docMk/>
-          <pc:sldMk cId="2414683238" sldId="336"/>
-        </pc:sldMkLst>
-      </pc:sldChg>
-      <pc:sldChg chg="del">
-        <pc:chgData name="Stephen Deck" userId="d0abce2a322c43a5" providerId="LiveId" clId="{ADFD2B2D-6693-472B-9AA3-4F1E67DE2D0B}" dt="2018-04-21T12:18:06.906" v="69" actId="2696"/>
-        <pc:sldMkLst>
-          <pc:docMk/>
-          <pc:sldMk cId="3909953668" sldId="337"/>
-        </pc:sldMkLst>
-      </pc:sldChg>
-      <pc:sldChg chg="del">
-        <pc:chgData name="Stephen Deck" userId="d0abce2a322c43a5" providerId="LiveId" clId="{ADFD2B2D-6693-472B-9AA3-4F1E67DE2D0B}" dt="2018-04-21T12:18:06.948" v="70" actId="2696"/>
-        <pc:sldMkLst>
-          <pc:docMk/>
-          <pc:sldMk cId="3891655222" sldId="338"/>
-        </pc:sldMkLst>
-      </pc:sldChg>
-      <pc:sldChg chg="del">
-        <pc:chgData name="Stephen Deck" userId="d0abce2a322c43a5" providerId="LiveId" clId="{ADFD2B2D-6693-472B-9AA3-4F1E67DE2D0B}" dt="2018-04-21T12:18:06.989" v="71" actId="2696"/>
-        <pc:sldMkLst>
-          <pc:docMk/>
-          <pc:sldMk cId="1265585465" sldId="339"/>
-        </pc:sldMkLst>
-      </pc:sldChg>
-      <pc:sldChg chg="del">
-        <pc:chgData name="Stephen Deck" userId="d0abce2a322c43a5" providerId="LiveId" clId="{ADFD2B2D-6693-472B-9AA3-4F1E67DE2D0B}" dt="2018-04-21T12:18:07.036" v="72" actId="2696"/>
-        <pc:sldMkLst>
-          <pc:docMk/>
-          <pc:sldMk cId="1339859580" sldId="340"/>
-        </pc:sldMkLst>
-      </pc:sldChg>
-      <pc:sldChg chg="del">
-        <pc:chgData name="Stephen Deck" userId="d0abce2a322c43a5" providerId="LiveId" clId="{ADFD2B2D-6693-472B-9AA3-4F1E67DE2D0B}" dt="2018-04-21T12:18:07.093" v="73" actId="2696"/>
-        <pc:sldMkLst>
-          <pc:docMk/>
-          <pc:sldMk cId="85330703" sldId="341"/>
-        </pc:sldMkLst>
-      </pc:sldChg>
-      <pc:sldChg chg="del">
-        <pc:chgData name="Stephen Deck" userId="d0abce2a322c43a5" providerId="LiveId" clId="{ADFD2B2D-6693-472B-9AA3-4F1E67DE2D0B}" dt="2018-04-21T12:18:07.150" v="74" actId="2696"/>
-        <pc:sldMkLst>
-          <pc:docMk/>
-          <pc:sldMk cId="2012231230" sldId="342"/>
-        </pc:sldMkLst>
-      </pc:sldChg>
-      <pc:sldChg chg="del">
-        <pc:chgData name="Stephen Deck" userId="d0abce2a322c43a5" providerId="LiveId" clId="{ADFD2B2D-6693-472B-9AA3-4F1E67DE2D0B}" dt="2018-04-21T12:18:07.241" v="76" actId="2696"/>
-        <pc:sldMkLst>
-          <pc:docMk/>
-          <pc:sldMk cId="3865876980" sldId="343"/>
-        </pc:sldMkLst>
-      </pc:sldChg>
-      <pc:sldChg chg="del">
-        <pc:chgData name="Stephen Deck" userId="d0abce2a322c43a5" providerId="LiveId" clId="{ADFD2B2D-6693-472B-9AA3-4F1E67DE2D0B}" dt="2018-04-21T12:18:07.278" v="77" actId="2696"/>
-        <pc:sldMkLst>
-          <pc:docMk/>
-          <pc:sldMk cId="2207310097" sldId="344"/>
-        </pc:sldMkLst>
-      </pc:sldChg>
-      <pc:sldChg chg="del">
-        <pc:chgData name="Stephen Deck" userId="d0abce2a322c43a5" providerId="LiveId" clId="{ADFD2B2D-6693-472B-9AA3-4F1E67DE2D0B}" dt="2018-04-21T12:18:07.319" v="78" actId="2696"/>
-        <pc:sldMkLst>
-          <pc:docMk/>
-          <pc:sldMk cId="1312908871" sldId="345"/>
-        </pc:sldMkLst>
-      </pc:sldChg>
-      <pc:sldChg chg="del">
-        <pc:chgData name="Stephen Deck" userId="d0abce2a322c43a5" providerId="LiveId" clId="{ADFD2B2D-6693-472B-9AA3-4F1E67DE2D0B}" dt="2018-04-21T12:23:04.569" v="79" actId="2696"/>
-        <pc:sldMkLst>
-          <pc:docMk/>
-          <pc:sldMk cId="2204550597" sldId="346"/>
-        </pc:sldMkLst>
-      </pc:sldChg>
-      <pc:sldChg chg="del">
-        <pc:chgData name="Stephen Deck" userId="d0abce2a322c43a5" providerId="LiveId" clId="{ADFD2B2D-6693-472B-9AA3-4F1E67DE2D0B}" dt="2018-04-21T12:23:04.605" v="80" actId="2696"/>
-        <pc:sldMkLst>
-          <pc:docMk/>
-          <pc:sldMk cId="3534747201" sldId="347"/>
-        </pc:sldMkLst>
-      </pc:sldChg>
-      <pc:sldChg chg="del">
-        <pc:chgData name="Stephen Deck" userId="d0abce2a322c43a5" providerId="LiveId" clId="{ADFD2B2D-6693-472B-9AA3-4F1E67DE2D0B}" dt="2018-04-21T12:23:04.648" v="81" actId="2696"/>
-        <pc:sldMkLst>
-          <pc:docMk/>
-          <pc:sldMk cId="3948927571" sldId="349"/>
-        </pc:sldMkLst>
-      </pc:sldChg>
-      <pc:sldChg chg="del">
-        <pc:chgData name="Stephen Deck" userId="d0abce2a322c43a5" providerId="LiveId" clId="{ADFD2B2D-6693-472B-9AA3-4F1E67DE2D0B}" dt="2018-04-21T12:23:58.241" v="82" actId="2696"/>
-        <pc:sldMkLst>
-          <pc:docMk/>
-          <pc:sldMk cId="2130247399" sldId="350"/>
-        </pc:sldMkLst>
-      </pc:sldChg>
-      <pc:sldChg chg="del">
-        <pc:chgData name="Stephen Deck" userId="d0abce2a322c43a5" providerId="LiveId" clId="{ADFD2B2D-6693-472B-9AA3-4F1E67DE2D0B}" dt="2018-04-21T12:23:58.277" v="83" actId="2696"/>
-        <pc:sldMkLst>
-          <pc:docMk/>
-          <pc:sldMk cId="2815884632" sldId="351"/>
-        </pc:sldMkLst>
-      </pc:sldChg>
-      <pc:sldChg chg="del">
-        <pc:chgData name="Stephen Deck" userId="d0abce2a322c43a5" providerId="LiveId" clId="{ADFD2B2D-6693-472B-9AA3-4F1E67DE2D0B}" dt="2018-04-21T12:23:58.319" v="84" actId="2696"/>
-        <pc:sldMkLst>
-          <pc:docMk/>
-          <pc:sldMk cId="645903311" sldId="352"/>
-        </pc:sldMkLst>
-      </pc:sldChg>
-      <pc:sldChg chg="del">
-        <pc:chgData name="Stephen Deck" userId="d0abce2a322c43a5" providerId="LiveId" clId="{ADFD2B2D-6693-472B-9AA3-4F1E67DE2D0B}" dt="2018-04-21T12:23:58.356" v="85" actId="2696"/>
-        <pc:sldMkLst>
-          <pc:docMk/>
-          <pc:sldMk cId="1351896557" sldId="353"/>
-        </pc:sldMkLst>
-      </pc:sldChg>
-      <pc:sldChg chg="del">
-        <pc:chgData name="Stephen Deck" userId="d0abce2a322c43a5" providerId="LiveId" clId="{ADFD2B2D-6693-472B-9AA3-4F1E67DE2D0B}" dt="2018-04-21T12:23:58.389" v="86" actId="2696"/>
-        <pc:sldMkLst>
-          <pc:docMk/>
-          <pc:sldMk cId="1939761547" sldId="354"/>
-        </pc:sldMkLst>
-      </pc:sldChg>
-      <pc:sldChg chg="del">
-        <pc:chgData name="Stephen Deck" userId="d0abce2a322c43a5" providerId="LiveId" clId="{ADFD2B2D-6693-472B-9AA3-4F1E67DE2D0B}" dt="2018-04-21T12:23:58.432" v="87" actId="2696"/>
-        <pc:sldMkLst>
-          <pc:docMk/>
-          <pc:sldMk cId="2539611937" sldId="355"/>
-        </pc:sldMkLst>
-      </pc:sldChg>
-      <pc:sldChg chg="del">
-        <pc:chgData name="Stephen Deck" userId="d0abce2a322c43a5" providerId="LiveId" clId="{ADFD2B2D-6693-472B-9AA3-4F1E67DE2D0B}" dt="2018-04-21T12:23:58.466" v="88" actId="2696"/>
-        <pc:sldMkLst>
-          <pc:docMk/>
-          <pc:sldMk cId="3237988328" sldId="356"/>
-        </pc:sldMkLst>
-      </pc:sldChg>
-      <pc:sldChg chg="del">
-        <pc:chgData name="Stephen Deck" userId="d0abce2a322c43a5" providerId="LiveId" clId="{ADFD2B2D-6693-472B-9AA3-4F1E67DE2D0B}" dt="2018-04-21T12:23:58.509" v="89" actId="2696"/>
-        <pc:sldMkLst>
-          <pc:docMk/>
-          <pc:sldMk cId="775615554" sldId="357"/>
-        </pc:sldMkLst>
-      </pc:sldChg>
-      <pc:sldChg chg="del">
-        <pc:chgData name="Stephen Deck" userId="d0abce2a322c43a5" providerId="LiveId" clId="{ADFD2B2D-6693-472B-9AA3-4F1E67DE2D0B}" dt="2018-04-21T12:23:58.640" v="92" actId="2696"/>
-        <pc:sldMkLst>
-          <pc:docMk/>
-          <pc:sldMk cId="1474166215" sldId="358"/>
-        </pc:sldMkLst>
-      </pc:sldChg>
-      <pc:sldChg chg="del">
-        <pc:chgData name="Stephen Deck" userId="d0abce2a322c43a5" providerId="LiveId" clId="{ADFD2B2D-6693-472B-9AA3-4F1E67DE2D0B}" dt="2018-04-21T12:23:59.079" v="102" actId="2696"/>
-        <pc:sldMkLst>
-          <pc:docMk/>
-          <pc:sldMk cId="1433789035" sldId="359"/>
-        </pc:sldMkLst>
-      </pc:sldChg>
-      <pc:sldChg chg="del">
-        <pc:chgData name="Stephen Deck" userId="d0abce2a322c43a5" providerId="LiveId" clId="{ADFD2B2D-6693-472B-9AA3-4F1E67DE2D0B}" dt="2018-04-21T12:23:59.121" v="103" actId="2696"/>
-        <pc:sldMkLst>
-          <pc:docMk/>
-          <pc:sldMk cId="21829071" sldId="360"/>
-        </pc:sldMkLst>
-      </pc:sldChg>
-      <pc:sldChg chg="del">
-        <pc:chgData name="Stephen Deck" userId="d0abce2a322c43a5" providerId="LiveId" clId="{ADFD2B2D-6693-472B-9AA3-4F1E67DE2D0B}" dt="2018-04-21T12:23:59.234" v="106" actId="2696"/>
-        <pc:sldMkLst>
-          <pc:docMk/>
-          <pc:sldMk cId="1914327718" sldId="361"/>
-        </pc:sldMkLst>
-      </pc:sldChg>
-      <pc:sldChg chg="del">
-        <pc:chgData name="Stephen Deck" userId="d0abce2a322c43a5" providerId="LiveId" clId="{ADFD2B2D-6693-472B-9AA3-4F1E67DE2D0B}" dt="2018-04-21T12:23:59.265" v="107" actId="2696"/>
-        <pc:sldMkLst>
-          <pc:docMk/>
-          <pc:sldMk cId="399534337" sldId="362"/>
-        </pc:sldMkLst>
-      </pc:sldChg>
-      <pc:sldChg chg="del">
-        <pc:chgData name="Stephen Deck" userId="d0abce2a322c43a5" providerId="LiveId" clId="{ADFD2B2D-6693-472B-9AA3-4F1E67DE2D0B}" dt="2018-04-21T12:23:59.297" v="108" actId="2696"/>
-        <pc:sldMkLst>
-          <pc:docMk/>
-          <pc:sldMk cId="2949869000" sldId="363"/>
-        </pc:sldMkLst>
-      </pc:sldChg>
-      <pc:sldChg chg="del">
-        <pc:chgData name="Stephen Deck" userId="d0abce2a322c43a5" providerId="LiveId" clId="{ADFD2B2D-6693-472B-9AA3-4F1E67DE2D0B}" dt="2018-04-21T12:23:59.326" v="109" actId="2696"/>
-        <pc:sldMkLst>
-          <pc:docMk/>
-          <pc:sldMk cId="2848570306" sldId="365"/>
-        </pc:sldMkLst>
-      </pc:sldChg>
-      <pc:sldChg chg="del">
-        <pc:chgData name="Stephen Deck" userId="d0abce2a322c43a5" providerId="LiveId" clId="{ADFD2B2D-6693-472B-9AA3-4F1E67DE2D0B}" dt="2018-04-21T12:23:59.354" v="110" actId="2696"/>
-        <pc:sldMkLst>
-          <pc:docMk/>
-          <pc:sldMk cId="421450490" sldId="366"/>
-        </pc:sldMkLst>
-      </pc:sldChg>
-      <pc:sldChg chg="del">
-        <pc:chgData name="Stephen Deck" userId="d0abce2a322c43a5" providerId="LiveId" clId="{ADFD2B2D-6693-472B-9AA3-4F1E67DE2D0B}" dt="2018-04-21T12:23:59.490" v="114" actId="2696"/>
-        <pc:sldMkLst>
-          <pc:docMk/>
-          <pc:sldMk cId="3564748429" sldId="367"/>
-        </pc:sldMkLst>
-      </pc:sldChg>
-      <pc:sldChg chg="del">
-        <pc:chgData name="Stephen Deck" userId="d0abce2a322c43a5" providerId="LiveId" clId="{ADFD2B2D-6693-472B-9AA3-4F1E67DE2D0B}" dt="2018-04-21T12:23:59.454" v="113" actId="2696"/>
-        <pc:sldMkLst>
-          <pc:docMk/>
-          <pc:sldMk cId="2802563986" sldId="368"/>
-        </pc:sldMkLst>
-      </pc:sldChg>
-      <pc:sldChg chg="del">
-        <pc:chgData name="Stephen Deck" userId="d0abce2a322c43a5" providerId="LiveId" clId="{ADFD2B2D-6693-472B-9AA3-4F1E67DE2D0B}" dt="2018-04-21T12:23:59.419" v="112" actId="2696"/>
-        <pc:sldMkLst>
-          <pc:docMk/>
-          <pc:sldMk cId="4024902832" sldId="369"/>
-        </pc:sldMkLst>
-      </pc:sldChg>
-      <pc:sldChg chg="del">
-        <pc:chgData name="Stephen Deck" userId="d0abce2a322c43a5" providerId="LiveId" clId="{ADFD2B2D-6693-472B-9AA3-4F1E67DE2D0B}" dt="2018-04-21T12:23:59.388" v="111" actId="2696"/>
-        <pc:sldMkLst>
-          <pc:docMk/>
-          <pc:sldMk cId="189293168" sldId="370"/>
-        </pc:sldMkLst>
-      </pc:sldChg>
-      <pc:sldChg chg="del">
-        <pc:chgData name="Stephen Deck" userId="d0abce2a322c43a5" providerId="LiveId" clId="{ADFD2B2D-6693-472B-9AA3-4F1E67DE2D0B}" dt="2018-04-21T12:23:59.196" v="105" actId="2696"/>
-        <pc:sldMkLst>
-          <pc:docMk/>
-          <pc:sldMk cId="3188304701" sldId="371"/>
-        </pc:sldMkLst>
-      </pc:sldChg>
-      <pc:sldChg chg="del">
-        <pc:chgData name="Stephen Deck" userId="d0abce2a322c43a5" providerId="LiveId" clId="{ADFD2B2D-6693-472B-9AA3-4F1E67DE2D0B}" dt="2018-04-21T12:23:59.563" v="116" actId="2696"/>
-        <pc:sldMkLst>
-          <pc:docMk/>
-          <pc:sldMk cId="2931724535" sldId="372"/>
-        </pc:sldMkLst>
-      </pc:sldChg>
-      <pc:sldChg chg="del">
-        <pc:chgData name="Stephen Deck" userId="d0abce2a322c43a5" providerId="LiveId" clId="{ADFD2B2D-6693-472B-9AA3-4F1E67DE2D0B}" dt="2018-04-21T12:23:59.590" v="117" actId="2696"/>
-        <pc:sldMkLst>
-          <pc:docMk/>
-          <pc:sldMk cId="1765812615" sldId="373"/>
-        </pc:sldMkLst>
-      </pc:sldChg>
-      <pc:sldChg chg="del">
-        <pc:chgData name="Stephen Deck" userId="d0abce2a322c43a5" providerId="LiveId" clId="{ADFD2B2D-6693-472B-9AA3-4F1E67DE2D0B}" dt="2018-04-21T12:23:59.626" v="118" actId="2696"/>
-        <pc:sldMkLst>
-          <pc:docMk/>
-          <pc:sldMk cId="1744680929" sldId="374"/>
-        </pc:sldMkLst>
-      </pc:sldChg>
-      <pc:sldChg chg="del">
-        <pc:chgData name="Stephen Deck" userId="d0abce2a322c43a5" providerId="LiveId" clId="{ADFD2B2D-6693-472B-9AA3-4F1E67DE2D0B}" dt="2018-04-21T12:23:59.660" v="119" actId="2696"/>
-        <pc:sldMkLst>
-          <pc:docMk/>
-          <pc:sldMk cId="1320427239" sldId="375"/>
-        </pc:sldMkLst>
-      </pc:sldChg>
-      <pc:sldChg chg="del">
-        <pc:chgData name="Stephen Deck" userId="d0abce2a322c43a5" providerId="LiveId" clId="{ADFD2B2D-6693-472B-9AA3-4F1E67DE2D0B}" dt="2018-04-21T12:23:59.688" v="120" actId="2696"/>
-        <pc:sldMkLst>
-          <pc:docMk/>
-          <pc:sldMk cId="62805852" sldId="376"/>
-        </pc:sldMkLst>
-      </pc:sldChg>
-      <pc:sldChg chg="del">
-        <pc:chgData name="Stephen Deck" userId="d0abce2a322c43a5" providerId="LiveId" clId="{ADFD2B2D-6693-472B-9AA3-4F1E67DE2D0B}" dt="2018-04-21T12:23:59.720" v="121" actId="2696"/>
-        <pc:sldMkLst>
-          <pc:docMk/>
-          <pc:sldMk cId="3426848012" sldId="377"/>
-        </pc:sldMkLst>
-      </pc:sldChg>
-      <pc:sldChg chg="del">
-        <pc:chgData name="Stephen Deck" userId="d0abce2a322c43a5" providerId="LiveId" clId="{ADFD2B2D-6693-472B-9AA3-4F1E67DE2D0B}" dt="2018-04-21T12:23:59.752" v="122" actId="2696"/>
-        <pc:sldMkLst>
-          <pc:docMk/>
-          <pc:sldMk cId="2528286959" sldId="378"/>
-        </pc:sldMkLst>
-      </pc:sldChg>
-      <pc:sldChg chg="del">
-        <pc:chgData name="Stephen Deck" userId="d0abce2a322c43a5" providerId="LiveId" clId="{ADFD2B2D-6693-472B-9AA3-4F1E67DE2D0B}" dt="2018-04-21T12:23:59.788" v="123" actId="2696"/>
-        <pc:sldMkLst>
-          <pc:docMk/>
-          <pc:sldMk cId="3883509570" sldId="379"/>
-        </pc:sldMkLst>
-      </pc:sldChg>
-      <pc:sldChg chg="del">
-        <pc:chgData name="Stephen Deck" userId="d0abce2a322c43a5" providerId="LiveId" clId="{ADFD2B2D-6693-472B-9AA3-4F1E67DE2D0B}" dt="2018-04-21T12:24:25.890" v="124" actId="2696"/>
-        <pc:sldMkLst>
-          <pc:docMk/>
-          <pc:sldMk cId="2682376677" sldId="380"/>
-        </pc:sldMkLst>
-      </pc:sldChg>
-      <pc:sldChg chg="del">
-        <pc:chgData name="Stephen Deck" userId="d0abce2a322c43a5" providerId="LiveId" clId="{ADFD2B2D-6693-472B-9AA3-4F1E67DE2D0B}" dt="2018-04-21T12:17:16.660" v="38" actId="2696"/>
-        <pc:sldMkLst>
-          <pc:docMk/>
-          <pc:sldMk cId="976370243" sldId="383"/>
-        </pc:sldMkLst>
-      </pc:sldChg>
-      <pc:sldChg chg="del">
-        <pc:chgData name="Stephen Deck" userId="d0abce2a322c43a5" providerId="LiveId" clId="{ADFD2B2D-6693-472B-9AA3-4F1E67DE2D0B}" dt="2018-04-21T12:17:16.704" v="39" actId="2696"/>
-        <pc:sldMkLst>
-          <pc:docMk/>
-          <pc:sldMk cId="2484096430" sldId="384"/>
-        </pc:sldMkLst>
-      </pc:sldChg>
-      <pc:sldChg chg="del">
-        <pc:chgData name="Stephen Deck" userId="d0abce2a322c43a5" providerId="LiveId" clId="{ADFD2B2D-6693-472B-9AA3-4F1E67DE2D0B}" dt="2018-04-21T12:24:25.915" v="125" actId="2696"/>
-        <pc:sldMkLst>
-          <pc:docMk/>
-          <pc:sldMk cId="2733044924" sldId="386"/>
-        </pc:sldMkLst>
-      </pc:sldChg>
-      <pc:sldChg chg="del">
-        <pc:chgData name="Stephen Deck" userId="d0abce2a322c43a5" providerId="LiveId" clId="{ADFD2B2D-6693-472B-9AA3-4F1E67DE2D0B}" dt="2018-04-21T12:24:25.942" v="126" actId="2696"/>
-        <pc:sldMkLst>
-          <pc:docMk/>
-          <pc:sldMk cId="3568275238" sldId="387"/>
-        </pc:sldMkLst>
-      </pc:sldChg>
-      <pc:sldChg chg="del">
-        <pc:chgData name="Stephen Deck" userId="d0abce2a322c43a5" providerId="LiveId" clId="{ADFD2B2D-6693-472B-9AA3-4F1E67DE2D0B}" dt="2018-04-21T12:24:25.998" v="128" actId="2696"/>
-        <pc:sldMkLst>
-          <pc:docMk/>
-          <pc:sldMk cId="3220758351" sldId="388"/>
-        </pc:sldMkLst>
-      </pc:sldChg>
-      <pc:sldChg chg="del">
-        <pc:chgData name="Stephen Deck" userId="d0abce2a322c43a5" providerId="LiveId" clId="{ADFD2B2D-6693-472B-9AA3-4F1E67DE2D0B}" dt="2018-04-21T12:24:25.970" v="127" actId="2696"/>
-        <pc:sldMkLst>
-          <pc:docMk/>
-          <pc:sldMk cId="1736159326" sldId="389"/>
-        </pc:sldMkLst>
-      </pc:sldChg>
-      <pc:sldChg chg="del">
-        <pc:chgData name="Stephen Deck" userId="d0abce2a322c43a5" providerId="LiveId" clId="{ADFD2B2D-6693-472B-9AA3-4F1E67DE2D0B}" dt="2018-04-21T12:24:26.028" v="129" actId="2696"/>
-        <pc:sldMkLst>
-          <pc:docMk/>
-          <pc:sldMk cId="1925846351" sldId="390"/>
-        </pc:sldMkLst>
-      </pc:sldChg>
-      <pc:sldChg chg="del">
-        <pc:chgData name="Stephen Deck" userId="d0abce2a322c43a5" providerId="LiveId" clId="{ADFD2B2D-6693-472B-9AA3-4F1E67DE2D0B}" dt="2018-04-21T12:55:57.753" v="145" actId="2696"/>
-        <pc:sldMkLst>
-          <pc:docMk/>
-          <pc:sldMk cId="2505900812" sldId="393"/>
-        </pc:sldMkLst>
-      </pc:sldChg>
-      <pc:sldChg chg="del">
-        <pc:chgData name="Stephen Deck" userId="d0abce2a322c43a5" providerId="LiveId" clId="{ADFD2B2D-6693-472B-9AA3-4F1E67DE2D0B}" dt="2018-04-21T12:55:57.837" v="148" actId="2696"/>
-        <pc:sldMkLst>
-          <pc:docMk/>
-          <pc:sldMk cId="536285060" sldId="394"/>
-        </pc:sldMkLst>
-      </pc:sldChg>
-      <pc:sldChg chg="del">
-        <pc:chgData name="Stephen Deck" userId="d0abce2a322c43a5" providerId="LiveId" clId="{ADFD2B2D-6693-472B-9AA3-4F1E67DE2D0B}" dt="2018-04-21T12:55:57.863" v="149" actId="2696"/>
-        <pc:sldMkLst>
-          <pc:docMk/>
-          <pc:sldMk cId="3199953633" sldId="395"/>
-        </pc:sldMkLst>
-      </pc:sldChg>
-      <pc:sldChg chg="del">
-        <pc:chgData name="Stephen Deck" userId="d0abce2a322c43a5" providerId="LiveId" clId="{ADFD2B2D-6693-472B-9AA3-4F1E67DE2D0B}" dt="2018-04-21T12:17:34.270" v="41" actId="2696"/>
-        <pc:sldMkLst>
-          <pc:docMk/>
-          <pc:sldMk cId="4023169222" sldId="396"/>
-        </pc:sldMkLst>
-      </pc:sldChg>
-      <pc:sldChg chg="del">
-        <pc:chgData name="Stephen Deck" userId="d0abce2a322c43a5" providerId="LiveId" clId="{ADFD2B2D-6693-472B-9AA3-4F1E67DE2D0B}" dt="2018-04-21T12:17:34.315" v="42" actId="2696"/>
-        <pc:sldMkLst>
-          <pc:docMk/>
-          <pc:sldMk cId="2042551873" sldId="397"/>
-        </pc:sldMkLst>
-      </pc:sldChg>
-      <pc:sldChg chg="del">
-        <pc:chgData name="Stephen Deck" userId="d0abce2a322c43a5" providerId="LiveId" clId="{ADFD2B2D-6693-472B-9AA3-4F1E67DE2D0B}" dt="2018-04-21T12:18:06.390" v="57" actId="2696"/>
-        <pc:sldMkLst>
-          <pc:docMk/>
-          <pc:sldMk cId="1830742713" sldId="398"/>
-        </pc:sldMkLst>
-      </pc:sldChg>
-      <pc:sldChg chg="del">
-        <pc:chgData name="Stephen Deck" userId="d0abce2a322c43a5" providerId="LiveId" clId="{ADFD2B2D-6693-472B-9AA3-4F1E67DE2D0B}" dt="2018-04-21T12:24:26.205" v="135" actId="2696"/>
-        <pc:sldMkLst>
-          <pc:docMk/>
-          <pc:sldMk cId="2341519082" sldId="400"/>
-        </pc:sldMkLst>
-      </pc:sldChg>
-      <pc:sldChg chg="del">
-        <pc:chgData name="Stephen Deck" userId="d0abce2a322c43a5" providerId="LiveId" clId="{ADFD2B2D-6693-472B-9AA3-4F1E67DE2D0B}" dt="2018-04-21T12:16:54.679" v="20" actId="2696"/>
-        <pc:sldMkLst>
-          <pc:docMk/>
-          <pc:sldMk cId="1379903200" sldId="401"/>
-        </pc:sldMkLst>
-      </pc:sldChg>
-      <pc:sldChg chg="del">
-        <pc:chgData name="Stephen Deck" userId="d0abce2a322c43a5" providerId="LiveId" clId="{ADFD2B2D-6693-472B-9AA3-4F1E67DE2D0B}" dt="2018-04-21T12:16:54.842" v="23" actId="2696"/>
-        <pc:sldMkLst>
-          <pc:docMk/>
-          <pc:sldMk cId="3968954586" sldId="403"/>
-        </pc:sldMkLst>
-      </pc:sldChg>
-      <pc:sldChg chg="del">
-        <pc:chgData name="Stephen Deck" userId="d0abce2a322c43a5" providerId="LiveId" clId="{ADFD2B2D-6693-472B-9AA3-4F1E67DE2D0B}" dt="2018-04-21T12:16:54.891" v="24" actId="2696"/>
-        <pc:sldMkLst>
-          <pc:docMk/>
-          <pc:sldMk cId="2717268728" sldId="404"/>
-        </pc:sldMkLst>
-      </pc:sldChg>
-      <pc:sldChg chg="del">
-        <pc:chgData name="Stephen Deck" userId="d0abce2a322c43a5" providerId="LiveId" clId="{ADFD2B2D-6693-472B-9AA3-4F1E67DE2D0B}" dt="2018-04-21T12:16:54.732" v="21" actId="2696"/>
-        <pc:sldMkLst>
-          <pc:docMk/>
-          <pc:sldMk cId="304009755" sldId="406"/>
-        </pc:sldMkLst>
-      </pc:sldChg>
-      <pc:sldChg chg="del">
-        <pc:chgData name="Stephen Deck" userId="d0abce2a322c43a5" providerId="LiveId" clId="{ADFD2B2D-6693-472B-9AA3-4F1E67DE2D0B}" dt="2018-04-21T12:16:54.784" v="22" actId="2696"/>
-        <pc:sldMkLst>
-          <pc:docMk/>
-          <pc:sldMk cId="30967562" sldId="407"/>
-        </pc:sldMkLst>
-      </pc:sldChg>
-      <pc:sldChg chg="del">
-        <pc:chgData name="Stephen Deck" userId="d0abce2a322c43a5" providerId="LiveId" clId="{ADFD2B2D-6693-472B-9AA3-4F1E67DE2D0B}" dt="2018-04-21T12:55:57.731" v="144" actId="2696"/>
-        <pc:sldMkLst>
-          <pc:docMk/>
-          <pc:sldMk cId="2008997013" sldId="408"/>
-        </pc:sldMkLst>
-      </pc:sldChg>
-      <pc:sldChg chg="del">
-        <pc:chgData name="Stephen Deck" userId="d0abce2a322c43a5" providerId="LiveId" clId="{ADFD2B2D-6693-472B-9AA3-4F1E67DE2D0B}" dt="2018-04-21T12:24:26.233" v="136" actId="2696"/>
-        <pc:sldMkLst>
-          <pc:docMk/>
-          <pc:sldMk cId="2771391754" sldId="409"/>
-        </pc:sldMkLst>
-      </pc:sldChg>
-      <pc:sldChg chg="del">
-        <pc:chgData name="Stephen Deck" userId="d0abce2a322c43a5" providerId="LiveId" clId="{ADFD2B2D-6693-472B-9AA3-4F1E67DE2D0B}" dt="2018-04-21T12:24:26.260" v="137" actId="2696"/>
-        <pc:sldMkLst>
-          <pc:docMk/>
-          <pc:sldMk cId="159151764" sldId="410"/>
-        </pc:sldMkLst>
-      </pc:sldChg>
-      <pc:sldChg chg="del">
-        <pc:chgData name="Stephen Deck" userId="d0abce2a322c43a5" providerId="LiveId" clId="{ADFD2B2D-6693-472B-9AA3-4F1E67DE2D0B}" dt="2018-04-21T12:24:26.289" v="138" actId="2696"/>
-        <pc:sldMkLst>
-          <pc:docMk/>
-          <pc:sldMk cId="2717788714" sldId="411"/>
-        </pc:sldMkLst>
-      </pc:sldChg>
-      <pc:sldChg chg="del">
-        <pc:chgData name="Stephen Deck" userId="d0abce2a322c43a5" providerId="LiveId" clId="{ADFD2B2D-6693-472B-9AA3-4F1E67DE2D0B}" dt="2018-04-21T12:24:26.325" v="139" actId="2696"/>
-        <pc:sldMkLst>
-          <pc:docMk/>
-          <pc:sldMk cId="300913623" sldId="412"/>
-        </pc:sldMkLst>
-      </pc:sldChg>
-      <pc:sldChg chg="del">
-        <pc:chgData name="Stephen Deck" userId="d0abce2a322c43a5" providerId="LiveId" clId="{ADFD2B2D-6693-472B-9AA3-4F1E67DE2D0B}" dt="2018-04-21T12:24:26.366" v="140" actId="2696"/>
-        <pc:sldMkLst>
-          <pc:docMk/>
-          <pc:sldMk cId="37753624" sldId="413"/>
-        </pc:sldMkLst>
-      </pc:sldChg>
-      <pc:sldChg chg="del">
-        <pc:chgData name="Stephen Deck" userId="d0abce2a322c43a5" providerId="LiveId" clId="{ADFD2B2D-6693-472B-9AA3-4F1E67DE2D0B}" dt="2018-04-21T12:24:26.388" v="141" actId="2696"/>
-        <pc:sldMkLst>
-          <pc:docMk/>
-          <pc:sldMk cId="3704253232" sldId="414"/>
-        </pc:sldMkLst>
-      </pc:sldChg>
-      <pc:sldChg chg="del">
-        <pc:chgData name="Stephen Deck" userId="d0abce2a322c43a5" providerId="LiveId" clId="{ADFD2B2D-6693-472B-9AA3-4F1E67DE2D0B}" dt="2018-04-21T12:55:57.888" v="150" actId="2696"/>
-        <pc:sldMkLst>
-          <pc:docMk/>
-          <pc:sldMk cId="1412416080" sldId="415"/>
-        </pc:sldMkLst>
-      </pc:sldChg>
-      <pc:sldChg chg="del">
-        <pc:chgData name="Stephen Deck" userId="d0abce2a322c43a5" providerId="LiveId" clId="{ADFD2B2D-6693-472B-9AA3-4F1E67DE2D0B}" dt="2018-04-21T12:55:57.932" v="152" actId="2696"/>
-        <pc:sldMkLst>
-          <pc:docMk/>
-          <pc:sldMk cId="1684458514" sldId="416"/>
-        </pc:sldMkLst>
-      </pc:sldChg>
-      <pc:sldChg chg="del">
-        <pc:chgData name="Stephen Deck" userId="d0abce2a322c43a5" providerId="LiveId" clId="{ADFD2B2D-6693-472B-9AA3-4F1E67DE2D0B}" dt="2018-04-21T12:55:58.026" v="155" actId="2696"/>
-        <pc:sldMkLst>
-          <pc:docMk/>
-          <pc:sldMk cId="2277319544" sldId="419"/>
-        </pc:sldMkLst>
-      </pc:sldChg>
-      <pc:sldChg chg="del">
-        <pc:chgData name="Stephen Deck" userId="d0abce2a322c43a5" providerId="LiveId" clId="{ADFD2B2D-6693-472B-9AA3-4F1E67DE2D0B}" dt="2018-04-21T12:55:58.182" v="160" actId="2696"/>
-        <pc:sldMkLst>
-          <pc:docMk/>
-          <pc:sldMk cId="4070910189" sldId="420"/>
-        </pc:sldMkLst>
-      </pc:sldChg>
-      <pc:sldChg chg="del">
-        <pc:chgData name="Stephen Deck" userId="d0abce2a322c43a5" providerId="LiveId" clId="{ADFD2B2D-6693-472B-9AA3-4F1E67DE2D0B}" dt="2018-04-21T12:24:26.420" v="142" actId="2696"/>
-        <pc:sldMkLst>
-          <pc:docMk/>
-          <pc:sldMk cId="1404534399" sldId="422"/>
-        </pc:sldMkLst>
-      </pc:sldChg>
-      <pc:sldChg chg="del">
-        <pc:chgData name="Stephen Deck" userId="d0abce2a322c43a5" providerId="LiveId" clId="{ADFD2B2D-6693-472B-9AA3-4F1E67DE2D0B}" dt="2018-04-21T12:55:57.784" v="146" actId="2696"/>
-        <pc:sldMkLst>
-          <pc:docMk/>
-          <pc:sldMk cId="3948489456" sldId="427"/>
-        </pc:sldMkLst>
-      </pc:sldChg>
-      <pc:sldChg chg="del">
-        <pc:chgData name="Stephen Deck" userId="d0abce2a322c43a5" providerId="LiveId" clId="{ADFD2B2D-6693-472B-9AA3-4F1E67DE2D0B}" dt="2018-04-21T12:55:57.959" v="153" actId="2696"/>
-        <pc:sldMkLst>
-          <pc:docMk/>
-          <pc:sldMk cId="1132157647" sldId="428"/>
-        </pc:sldMkLst>
-      </pc:sldChg>
-      <pc:sldChg chg="del">
-        <pc:chgData name="Stephen Deck" userId="d0abce2a322c43a5" providerId="LiveId" clId="{ADFD2B2D-6693-472B-9AA3-4F1E67DE2D0B}" dt="2018-04-21T12:55:57.810" v="147" actId="2696"/>
-        <pc:sldMkLst>
-          <pc:docMk/>
-          <pc:sldMk cId="3157426562" sldId="429"/>
-        </pc:sldMkLst>
-      </pc:sldChg>
-      <pc:sldChg chg="del">
-        <pc:chgData name="Stephen Deck" userId="d0abce2a322c43a5" providerId="LiveId" clId="{ADFD2B2D-6693-472B-9AA3-4F1E67DE2D0B}" dt="2018-04-21T12:24:26.062" v="130" actId="2696"/>
-        <pc:sldMkLst>
-          <pc:docMk/>
-          <pc:sldMk cId="1207566757" sldId="435"/>
-        </pc:sldMkLst>
-      </pc:sldChg>
-      <pc:sldChg chg="del">
-        <pc:chgData name="Stephen Deck" userId="d0abce2a322c43a5" providerId="LiveId" clId="{ADFD2B2D-6693-472B-9AA3-4F1E67DE2D0B}" dt="2018-04-21T12:24:26.091" v="131" actId="2696"/>
-        <pc:sldMkLst>
-          <pc:docMk/>
-          <pc:sldMk cId="4059609398" sldId="436"/>
-        </pc:sldMkLst>
-      </pc:sldChg>
-      <pc:sldChg chg="del">
-        <pc:chgData name="Stephen Deck" userId="d0abce2a322c43a5" providerId="LiveId" clId="{ADFD2B2D-6693-472B-9AA3-4F1E67DE2D0B}" dt="2018-04-21T12:24:26.124" v="132" actId="2696"/>
-        <pc:sldMkLst>
-          <pc:docMk/>
-          <pc:sldMk cId="770554393" sldId="437"/>
-        </pc:sldMkLst>
-      </pc:sldChg>
-      <pc:sldChg chg="del">
-        <pc:chgData name="Stephen Deck" userId="d0abce2a322c43a5" providerId="LiveId" clId="{ADFD2B2D-6693-472B-9AA3-4F1E67DE2D0B}" dt="2018-04-21T12:24:26.151" v="133" actId="2696"/>
-        <pc:sldMkLst>
-          <pc:docMk/>
-          <pc:sldMk cId="2371717314" sldId="438"/>
-        </pc:sldMkLst>
-      </pc:sldChg>
-      <pc:sldChg chg="del">
-        <pc:chgData name="Stephen Deck" userId="d0abce2a322c43a5" providerId="LiveId" clId="{ADFD2B2D-6693-472B-9AA3-4F1E67DE2D0B}" dt="2018-04-21T12:24:26.173" v="134" actId="2696"/>
-        <pc:sldMkLst>
-          <pc:docMk/>
-          <pc:sldMk cId="3953669788" sldId="439"/>
-        </pc:sldMkLst>
-      </pc:sldChg>
-      <pc:sldChg chg="del">
-        <pc:chgData name="Stephen Deck" userId="d0abce2a322c43a5" providerId="LiveId" clId="{ADFD2B2D-6693-472B-9AA3-4F1E67DE2D0B}" dt="2018-04-21T12:55:57.999" v="154" actId="2696"/>
-        <pc:sldMkLst>
-          <pc:docMk/>
-          <pc:sldMk cId="2742684266" sldId="441"/>
-        </pc:sldMkLst>
-      </pc:sldChg>
-      <pc:sldChg chg="del">
-        <pc:chgData name="Stephen Deck" userId="d0abce2a322c43a5" providerId="LiveId" clId="{ADFD2B2D-6693-472B-9AA3-4F1E67DE2D0B}" dt="2018-04-21T12:23:59.164" v="104" actId="2696"/>
-        <pc:sldMkLst>
-          <pc:docMk/>
-          <pc:sldMk cId="486904506" sldId="442"/>
-        </pc:sldMkLst>
-      </pc:sldChg>
-      <pc:sldChg chg="del">
-        <pc:chgData name="Stephen Deck" userId="d0abce2a322c43a5" providerId="LiveId" clId="{ADFD2B2D-6693-472B-9AA3-4F1E67DE2D0B}" dt="2018-04-21T12:23:59.525" v="115" actId="2696"/>
-        <pc:sldMkLst>
-          <pc:docMk/>
-          <pc:sldMk cId="3110816959" sldId="443"/>
-        </pc:sldMkLst>
-      </pc:sldChg>
-      <pc:sldChg chg="del">
-        <pc:chgData name="Stephen Deck" userId="d0abce2a322c43a5" providerId="LiveId" clId="{ADFD2B2D-6693-472B-9AA3-4F1E67DE2D0B}" dt="2018-04-21T12:55:58.074" v="156" actId="2696"/>
-        <pc:sldMkLst>
-          <pc:docMk/>
-          <pc:sldMk cId="439708885" sldId="444"/>
-        </pc:sldMkLst>
-      </pc:sldChg>
-      <pc:sldChg chg="del">
-        <pc:chgData name="Stephen Deck" userId="d0abce2a322c43a5" providerId="LiveId" clId="{ADFD2B2D-6693-472B-9AA3-4F1E67DE2D0B}" dt="2018-04-21T12:55:58.110" v="157" actId="2696"/>
-        <pc:sldMkLst>
-          <pc:docMk/>
-          <pc:sldMk cId="3509323785" sldId="445"/>
-        </pc:sldMkLst>
-      </pc:sldChg>
-      <pc:sldChg chg="del">
-        <pc:chgData name="Stephen Deck" userId="d0abce2a322c43a5" providerId="LiveId" clId="{ADFD2B2D-6693-472B-9AA3-4F1E67DE2D0B}" dt="2018-04-21T12:55:58.136" v="158" actId="2696"/>
-        <pc:sldMkLst>
-          <pc:docMk/>
-          <pc:sldMk cId="1179380902" sldId="446"/>
-        </pc:sldMkLst>
-      </pc:sldChg>
-      <pc:sldChg chg="del">
-        <pc:chgData name="Stephen Deck" userId="d0abce2a322c43a5" providerId="LiveId" clId="{ADFD2B2D-6693-472B-9AA3-4F1E67DE2D0B}" dt="2018-04-21T12:55:58.157" v="159" actId="2696"/>
-        <pc:sldMkLst>
-          <pc:docMk/>
-          <pc:sldMk cId="1997960080" sldId="447"/>
-        </pc:sldMkLst>
-      </pc:sldChg>
-      <pc:sldChg chg="del">
-        <pc:chgData name="Stephen Deck" userId="d0abce2a322c43a5" providerId="LiveId" clId="{ADFD2B2D-6693-472B-9AA3-4F1E67DE2D0B}" dt="2018-04-21T12:55:58.210" v="161" actId="2696"/>
-        <pc:sldMkLst>
-          <pc:docMk/>
-          <pc:sldMk cId="2794440907" sldId="448"/>
-        </pc:sldMkLst>
-      </pc:sldChg>
-      <pc:sldChg chg="del">
-        <pc:chgData name="Stephen Deck" userId="d0abce2a322c43a5" providerId="LiveId" clId="{ADFD2B2D-6693-472B-9AA3-4F1E67DE2D0B}" dt="2018-04-21T12:55:58.238" v="162" actId="2696"/>
-        <pc:sldMkLst>
-          <pc:docMk/>
-          <pc:sldMk cId="4107462780" sldId="449"/>
-        </pc:sldMkLst>
-      </pc:sldChg>
-      <pc:sldChg chg="del">
-        <pc:chgData name="Stephen Deck" userId="d0abce2a322c43a5" providerId="LiveId" clId="{ADFD2B2D-6693-472B-9AA3-4F1E67DE2D0B}" dt="2018-04-21T12:55:58.262" v="163" actId="2696"/>
-        <pc:sldMkLst>
-          <pc:docMk/>
-          <pc:sldMk cId="2334402215" sldId="450"/>
-        </pc:sldMkLst>
-      </pc:sldChg>
-      <pc:sldChg chg="del">
-        <pc:chgData name="Stephen Deck" userId="d0abce2a322c43a5" providerId="LiveId" clId="{ADFD2B2D-6693-472B-9AA3-4F1E67DE2D0B}" dt="2018-04-21T12:55:58.294" v="164" actId="2696"/>
-        <pc:sldMkLst>
-          <pc:docMk/>
-          <pc:sldMk cId="3301704759" sldId="451"/>
-        </pc:sldMkLst>
-      </pc:sldChg>
-      <pc:sldChg chg="del">
-        <pc:chgData name="Stephen Deck" userId="d0abce2a322c43a5" providerId="LiveId" clId="{ADFD2B2D-6693-472B-9AA3-4F1E67DE2D0B}" dt="2018-04-21T12:55:58.319" v="165" actId="2696"/>
-        <pc:sldMkLst>
-          <pc:docMk/>
-          <pc:sldMk cId="162672288" sldId="452"/>
-        </pc:sldMkLst>
-      </pc:sldChg>
-      <pc:sldChg chg="del">
-        <pc:chgData name="Stephen Deck" userId="d0abce2a322c43a5" providerId="LiveId" clId="{ADFD2B2D-6693-472B-9AA3-4F1E67DE2D0B}" dt="2018-04-21T12:55:58.340" v="166" actId="2696"/>
-        <pc:sldMkLst>
-          <pc:docMk/>
-          <pc:sldMk cId="1436037254" sldId="453"/>
-        </pc:sldMkLst>
-      </pc:sldChg>
-      <pc:sldChg chg="del">
-        <pc:chgData name="Stephen Deck" userId="d0abce2a322c43a5" providerId="LiveId" clId="{ADFD2B2D-6693-472B-9AA3-4F1E67DE2D0B}" dt="2018-04-21T12:55:58.366" v="167" actId="2696"/>
-        <pc:sldMkLst>
-          <pc:docMk/>
-          <pc:sldMk cId="242031741" sldId="454"/>
-        </pc:sldMkLst>
-      </pc:sldChg>
-      <pc:sldChg chg="del">
-        <pc:chgData name="Stephen Deck" userId="d0abce2a322c43a5" providerId="LiveId" clId="{ADFD2B2D-6693-472B-9AA3-4F1E67DE2D0B}" dt="2018-04-21T12:55:58.388" v="168" actId="2696"/>
-        <pc:sldMkLst>
-          <pc:docMk/>
-          <pc:sldMk cId="1778421848" sldId="455"/>
-        </pc:sldMkLst>
-      </pc:sldChg>
-      <pc:sldChg chg="del">
-        <pc:chgData name="Stephen Deck" userId="d0abce2a322c43a5" providerId="LiveId" clId="{ADFD2B2D-6693-472B-9AA3-4F1E67DE2D0B}" dt="2018-04-21T12:55:58.433" v="170" actId="2696"/>
-        <pc:sldMkLst>
-          <pc:docMk/>
-          <pc:sldMk cId="1472308732" sldId="456"/>
-        </pc:sldMkLst>
-      </pc:sldChg>
-      <pc:sldChg chg="del">
-        <pc:chgData name="Stephen Deck" userId="d0abce2a322c43a5" providerId="LiveId" clId="{ADFD2B2D-6693-472B-9AA3-4F1E67DE2D0B}" dt="2018-04-21T12:55:58.407" v="169" actId="2696"/>
-        <pc:sldMkLst>
-          <pc:docMk/>
-          <pc:sldMk cId="4212310306" sldId="457"/>
-        </pc:sldMkLst>
-      </pc:sldChg>
-      <pc:sldChg chg="del">
-        <pc:chgData name="Stephen Deck" userId="d0abce2a322c43a5" providerId="LiveId" clId="{ADFD2B2D-6693-472B-9AA3-4F1E67DE2D0B}" dt="2018-04-21T12:55:58.452" v="171" actId="2696"/>
-        <pc:sldMkLst>
-          <pc:docMk/>
-          <pc:sldMk cId="1530571410" sldId="458"/>
-        </pc:sldMkLst>
-      </pc:sldChg>
-      <pc:sldChg chg="del">
-        <pc:chgData name="Stephen Deck" userId="d0abce2a322c43a5" providerId="LiveId" clId="{ADFD2B2D-6693-472B-9AA3-4F1E67DE2D0B}" dt="2018-04-21T12:55:58.469" v="172" actId="2696"/>
-        <pc:sldMkLst>
-          <pc:docMk/>
-          <pc:sldMk cId="588550850" sldId="459"/>
-        </pc:sldMkLst>
-      </pc:sldChg>
-      <pc:sldChg chg="del">
-        <pc:chgData name="Stephen Deck" userId="d0abce2a322c43a5" providerId="LiveId" clId="{ADFD2B2D-6693-472B-9AA3-4F1E67DE2D0B}" dt="2018-04-21T12:16:54.993" v="26" actId="2696"/>
-        <pc:sldMkLst>
-          <pc:docMk/>
-          <pc:sldMk cId="2520845146" sldId="460"/>
-        </pc:sldMkLst>
-      </pc:sldChg>
-      <pc:sldChg chg="del">
-        <pc:chgData name="Stephen Deck" userId="d0abce2a322c43a5" providerId="LiveId" clId="{ADFD2B2D-6693-472B-9AA3-4F1E67DE2D0B}" dt="2018-04-21T12:17:01.680" v="31" actId="2696"/>
-        <pc:sldMkLst>
-          <pc:docMk/>
-          <pc:sldMk cId="1316418490" sldId="461"/>
-        </pc:sldMkLst>
-      </pc:sldChg>
-      <pc:sldChg chg="del">
-        <pc:chgData name="Stephen Deck" userId="d0abce2a322c43a5" providerId="LiveId" clId="{ADFD2B2D-6693-472B-9AA3-4F1E67DE2D0B}" dt="2018-04-21T12:17:01.813" v="34" actId="2696"/>
-        <pc:sldMkLst>
-          <pc:docMk/>
-          <pc:sldMk cId="58854909" sldId="462"/>
-        </pc:sldMkLst>
-      </pc:sldChg>
-      <pc:sldChg chg="del">
-        <pc:chgData name="Stephen Deck" userId="d0abce2a322c43a5" providerId="LiveId" clId="{ADFD2B2D-6693-472B-9AA3-4F1E67DE2D0B}" dt="2018-04-21T12:17:01.766" v="33" actId="2696"/>
-        <pc:sldMkLst>
-          <pc:docMk/>
-          <pc:sldMk cId="3244318879" sldId="463"/>
-        </pc:sldMkLst>
-      </pc:sldChg>
-      <pc:sldChg chg="del">
-        <pc:chgData name="Stephen Deck" userId="d0abce2a322c43a5" providerId="LiveId" clId="{ADFD2B2D-6693-472B-9AA3-4F1E67DE2D0B}" dt="2018-04-21T12:17:01.723" v="32" actId="2696"/>
-        <pc:sldMkLst>
-          <pc:docMk/>
-          <pc:sldMk cId="1896849846" sldId="464"/>
-        </pc:sldMkLst>
-      </pc:sldChg>
-      <pc:sldChg chg="del">
-        <pc:chgData name="Stephen Deck" userId="d0abce2a322c43a5" providerId="LiveId" clId="{ADFD2B2D-6693-472B-9AA3-4F1E67DE2D0B}" dt="2018-04-21T12:55:57.710" v="143" actId="2696"/>
-        <pc:sldMkLst>
-          <pc:docMk/>
-          <pc:sldMk cId="677845411" sldId="465"/>
-        </pc:sldMkLst>
-      </pc:sldChg>
-      <pc:sldChg chg="del">
-        <pc:chgData name="Stephen Deck" userId="d0abce2a322c43a5" providerId="LiveId" clId="{ADFD2B2D-6693-472B-9AA3-4F1E67DE2D0B}" dt="2018-04-21T12:23:58.697" v="93" actId="2696"/>
-        <pc:sldMkLst>
-          <pc:docMk/>
-          <pc:sldMk cId="3464729142" sldId="467"/>
-        </pc:sldMkLst>
-      </pc:sldChg>
-      <pc:sldChg chg="del">
-        <pc:chgData name="Stephen Deck" userId="d0abce2a322c43a5" providerId="LiveId" clId="{ADFD2B2D-6693-472B-9AA3-4F1E67DE2D0B}" dt="2018-04-21T12:18:07.197" v="75" actId="2696"/>
-        <pc:sldMkLst>
-          <pc:docMk/>
-          <pc:sldMk cId="101173943" sldId="468"/>
-        </pc:sldMkLst>
-      </pc:sldChg>
-      <pc:sldChg chg="del">
-        <pc:chgData name="Stephen Deck" userId="d0abce2a322c43a5" providerId="LiveId" clId="{ADFD2B2D-6693-472B-9AA3-4F1E67DE2D0B}" dt="2018-04-21T12:23:58.556" v="90" actId="2696"/>
-        <pc:sldMkLst>
-          <pc:docMk/>
-          <pc:sldMk cId="759969192" sldId="469"/>
-        </pc:sldMkLst>
-      </pc:sldChg>
-      <pc:sldChg chg="del">
-        <pc:chgData name="Stephen Deck" userId="d0abce2a322c43a5" providerId="LiveId" clId="{ADFD2B2D-6693-472B-9AA3-4F1E67DE2D0B}" dt="2018-04-21T12:17:01.865" v="35" actId="2696"/>
-        <pc:sldMkLst>
-          <pc:docMk/>
-          <pc:sldMk cId="1192982503" sldId="470"/>
-        </pc:sldMkLst>
-      </pc:sldChg>
-      <pc:sldChg chg="del">
-        <pc:chgData name="Stephen Deck" userId="d0abce2a322c43a5" providerId="LiveId" clId="{ADFD2B2D-6693-472B-9AA3-4F1E67DE2D0B}" dt="2018-04-21T12:16:54.951" v="25" actId="2696"/>
-        <pc:sldMkLst>
-          <pc:docMk/>
-          <pc:sldMk cId="3971661310" sldId="471"/>
-        </pc:sldMkLst>
-      </pc:sldChg>
-      <pc:sldChg chg="del">
-        <pc:chgData name="Stephen Deck" userId="d0abce2a322c43a5" providerId="LiveId" clId="{ADFD2B2D-6693-472B-9AA3-4F1E67DE2D0B}" dt="2018-04-21T12:23:58.759" v="94" actId="2696"/>
-        <pc:sldMkLst>
-          <pc:docMk/>
-          <pc:sldMk cId="1518876813" sldId="472"/>
-        </pc:sldMkLst>
-      </pc:sldChg>
-      <pc:sldChg chg="del">
-        <pc:chgData name="Stephen Deck" userId="d0abce2a322c43a5" providerId="LiveId" clId="{ADFD2B2D-6693-472B-9AA3-4F1E67DE2D0B}" dt="2018-04-21T12:23:58.972" v="99" actId="2696"/>
-        <pc:sldMkLst>
-          <pc:docMk/>
-          <pc:sldMk cId="2480881042" sldId="474"/>
-        </pc:sldMkLst>
-      </pc:sldChg>
-      <pc:sldChg chg="del">
-        <pc:chgData name="Stephen Deck" userId="d0abce2a322c43a5" providerId="LiveId" clId="{ADFD2B2D-6693-472B-9AA3-4F1E67DE2D0B}" dt="2018-04-21T12:23:58.855" v="96" actId="2696"/>
-        <pc:sldMkLst>
-          <pc:docMk/>
-          <pc:sldMk cId="423756975" sldId="475"/>
-        </pc:sldMkLst>
-      </pc:sldChg>
-      <pc:sldChg chg="del">
-        <pc:chgData name="Stephen Deck" userId="d0abce2a322c43a5" providerId="LiveId" clId="{ADFD2B2D-6693-472B-9AA3-4F1E67DE2D0B}" dt="2018-04-21T12:23:58.801" v="95" actId="2696"/>
-        <pc:sldMkLst>
-          <pc:docMk/>
-          <pc:sldMk cId="1801004150" sldId="476"/>
-        </pc:sldMkLst>
-      </pc:sldChg>
-      <pc:sldChg chg="del">
-        <pc:chgData name="Stephen Deck" userId="d0abce2a322c43a5" providerId="LiveId" clId="{ADFD2B2D-6693-472B-9AA3-4F1E67DE2D0B}" dt="2018-04-21T12:23:58.898" v="97" actId="2696"/>
-        <pc:sldMkLst>
-          <pc:docMk/>
-          <pc:sldMk cId="1446335086" sldId="477"/>
-        </pc:sldMkLst>
-      </pc:sldChg>
-      <pc:sldChg chg="del">
-        <pc:chgData name="Stephen Deck" userId="d0abce2a322c43a5" providerId="LiveId" clId="{ADFD2B2D-6693-472B-9AA3-4F1E67DE2D0B}" dt="2018-04-21T12:23:58.939" v="98" actId="2696"/>
-        <pc:sldMkLst>
-          <pc:docMk/>
-          <pc:sldMk cId="562793019" sldId="478"/>
-        </pc:sldMkLst>
-      </pc:sldChg>
-      <pc:sldChg chg="del">
-        <pc:chgData name="Stephen Deck" userId="d0abce2a322c43a5" providerId="LiveId" clId="{ADFD2B2D-6693-472B-9AA3-4F1E67DE2D0B}" dt="2018-04-21T12:23:58.594" v="91" actId="2696"/>
-        <pc:sldMkLst>
-          <pc:docMk/>
-          <pc:sldMk cId="1775319140" sldId="479"/>
-        </pc:sldMkLst>
-      </pc:sldChg>
       <pc:sldMasterChg chg="delSldLayout">
         <pc:chgData name="Stephen Deck" userId="d0abce2a322c43a5" providerId="LiveId" clId="{ADFD2B2D-6693-472B-9AA3-4F1E67DE2D0B}" dt="2018-04-21T12:55:57.902" v="151" actId="2696"/>
         <pc:sldMasterMkLst>
           <pc:docMk/>
           <pc:sldMasterMk cId="1381684232" sldId="2147483660"/>
         </pc:sldMasterMkLst>
-        <pc:sldLayoutChg chg="del">
-          <pc:chgData name="Stephen Deck" userId="d0abce2a322c43a5" providerId="LiveId" clId="{ADFD2B2D-6693-472B-9AA3-4F1E67DE2D0B}" dt="2018-04-21T12:55:57.902" v="151" actId="2696"/>
-          <pc:sldLayoutMkLst>
-            <pc:docMk/>
-            <pc:sldMasterMk cId="1381684232" sldId="2147483660"/>
-            <pc:sldLayoutMk cId="1901946306" sldId="2147483686"/>
-          </pc:sldLayoutMkLst>
-        </pc:sldLayoutChg>
       </pc:sldMasterChg>
     </pc:docChg>
   </pc:docChgLst>
@@ -6986,7 +5791,7 @@
             <a:fld id="{F0A6AF3A-C228-024A-8C2E-6E0FCC8DEC76}" type="datetimeFigureOut">
               <a:rPr lang="en-US" smtClean="0"/>
               <a:pPr/>
-              <a:t>4/12/2018</a:t>
+              <a:t>4/23/2018</a:t>
             </a:fld>
             <a:endParaRPr lang="en-US" dirty="0"/>
           </a:p>
@@ -8034,7 +6839,7 @@
           <a:p>
             <a:fld id="{869A38CF-E133-2243-90F7-979D11E866BA}" type="datetime4">
               <a:rPr lang="en-US" smtClean="0"/>
-              <a:t>April 12, 2018</a:t>
+              <a:t>April 23, 2018</a:t>
             </a:fld>
             <a:endParaRPr lang="en-CA" dirty="0"/>
           </a:p>
@@ -8311,7 +7116,7 @@
           <a:p>
             <a:fld id="{869A38CF-E133-2243-90F7-979D11E866BA}" type="datetime4">
               <a:rPr lang="en-US" smtClean="0"/>
-              <a:t>April 12, 2018</a:t>
+              <a:t>April 23, 2018</a:t>
             </a:fld>
             <a:endParaRPr lang="en-CA" dirty="0"/>
           </a:p>
@@ -8576,7 +7381,7 @@
           <a:p>
             <a:fld id="{869A38CF-E133-2243-90F7-979D11E866BA}" type="datetime4">
               <a:rPr lang="en-US" smtClean="0"/>
-              <a:t>April 12, 2018</a:t>
+              <a:t>April 23, 2018</a:t>
             </a:fld>
             <a:endParaRPr lang="en-CA" dirty="0"/>
           </a:p>
@@ -8784,7 +7589,7 @@
             <a:fld id="{869A38CF-E133-2243-90F7-979D11E866BA}" type="datetime4">
               <a:rPr lang="en-US" smtClean="0"/>
               <a:pPr/>
-              <a:t>April 12, 2018</a:t>
+              <a:t>April 23, 2018</a:t>
             </a:fld>
             <a:endParaRPr lang="en-CA" dirty="0"/>
           </a:p>
@@ -9113,7 +7918,7 @@
             <a:fld id="{869A38CF-E133-2243-90F7-979D11E866BA}" type="datetime4">
               <a:rPr lang="en-US" smtClean="0"/>
               <a:pPr/>
-              <a:t>April 12, 2018</a:t>
+              <a:t>April 23, 2018</a:t>
             </a:fld>
             <a:endParaRPr lang="en-CA" dirty="0"/>
           </a:p>
@@ -9464,7 +8269,7 @@
             <a:fld id="{869A38CF-E133-2243-90F7-979D11E866BA}" type="datetime4">
               <a:rPr lang="en-US" smtClean="0"/>
               <a:pPr/>
-              <a:t>April 12, 2018</a:t>
+              <a:t>April 23, 2018</a:t>
             </a:fld>
             <a:endParaRPr lang="en-CA" dirty="0"/>
           </a:p>
@@ -9740,7 +8545,7 @@
             <a:fld id="{869A38CF-E133-2243-90F7-979D11E866BA}" type="datetime4">
               <a:rPr lang="en-US" smtClean="0"/>
               <a:pPr/>
-              <a:t>April 12, 2018</a:t>
+              <a:t>April 23, 2018</a:t>
             </a:fld>
             <a:endParaRPr lang="en-CA" dirty="0"/>
           </a:p>
@@ -9931,7 +8736,7 @@
             <a:fld id="{869A38CF-E133-2243-90F7-979D11E866BA}" type="datetime4">
               <a:rPr lang="en-US" smtClean="0"/>
               <a:pPr/>
-              <a:t>April 12, 2018</a:t>
+              <a:t>April 23, 2018</a:t>
             </a:fld>
             <a:endParaRPr lang="en-CA" dirty="0"/>
           </a:p>
@@ -10166,7 +8971,7 @@
             <a:fld id="{869A38CF-E133-2243-90F7-979D11E866BA}" type="datetime4">
               <a:rPr lang="en-US" smtClean="0"/>
               <a:pPr/>
-              <a:t>April 12, 2018</a:t>
+              <a:t>April 23, 2018</a:t>
             </a:fld>
             <a:endParaRPr lang="en-CA" dirty="0"/>
           </a:p>
@@ -10377,7 +9182,7 @@
             <a:fld id="{869A38CF-E133-2243-90F7-979D11E866BA}" type="datetime4">
               <a:rPr lang="en-US" smtClean="0"/>
               <a:pPr/>
-              <a:t>April 12, 2018</a:t>
+              <a:t>April 23, 2018</a:t>
             </a:fld>
             <a:endParaRPr lang="en-CA" dirty="0"/>
           </a:p>
@@ -10701,7 +9506,7 @@
             <a:fld id="{869A38CF-E133-2243-90F7-979D11E866BA}" type="datetime4">
               <a:rPr lang="en-US" smtClean="0"/>
               <a:pPr/>
-              <a:t>April 12, 2018</a:t>
+              <a:t>April 23, 2018</a:t>
             </a:fld>
             <a:endParaRPr lang="en-CA" dirty="0"/>
           </a:p>
@@ -10837,7 +9642,7 @@
           <a:p>
             <a:fld id="{869A38CF-E133-2243-90F7-979D11E866BA}" type="datetime4">
               <a:rPr lang="en-US" smtClean="0"/>
-              <a:t>April 12, 2018</a:t>
+              <a:t>April 23, 2018</a:t>
             </a:fld>
             <a:endParaRPr lang="en-CA" dirty="0"/>
           </a:p>
@@ -11214,7 +10019,7 @@
             <a:fld id="{869A38CF-E133-2243-90F7-979D11E866BA}" type="datetime4">
               <a:rPr lang="en-US" smtClean="0"/>
               <a:pPr/>
-              <a:t>April 12, 2018</a:t>
+              <a:t>April 23, 2018</a:t>
             </a:fld>
             <a:endParaRPr lang="en-CA" dirty="0"/>
           </a:p>
@@ -11351,7 +10156,7 @@
             <a:fld id="{869A38CF-E133-2243-90F7-979D11E866BA}" type="datetime4">
               <a:rPr lang="en-US" smtClean="0"/>
               <a:pPr/>
-              <a:t>April 12, 2018</a:t>
+              <a:t>April 23, 2018</a:t>
             </a:fld>
             <a:endParaRPr lang="en-CA" dirty="0"/>
           </a:p>
@@ -11576,7 +10381,7 @@
             <a:fld id="{869A38CF-E133-2243-90F7-979D11E866BA}" type="datetime4">
               <a:rPr lang="en-US" smtClean="0"/>
               <a:pPr/>
-              <a:t>April 12, 2018</a:t>
+              <a:t>April 23, 2018</a:t>
             </a:fld>
             <a:endParaRPr lang="en-CA" dirty="0"/>
           </a:p>
@@ -11899,7 +10704,7 @@
           <a:p>
             <a:fld id="{869A38CF-E133-2243-90F7-979D11E866BA}" type="datetime4">
               <a:rPr lang="en-US" smtClean="0"/>
-              <a:t>April 12, 2018</a:t>
+              <a:t>April 23, 2018</a:t>
             </a:fld>
             <a:endParaRPr lang="en-CA" dirty="0"/>
           </a:p>
@@ -12162,7 +10967,7 @@
           <a:p>
             <a:fld id="{869A38CF-E133-2243-90F7-979D11E866BA}" type="datetime4">
               <a:rPr lang="en-US" smtClean="0"/>
-              <a:t>April 12, 2018</a:t>
+              <a:t>April 23, 2018</a:t>
             </a:fld>
             <a:endParaRPr lang="en-CA" dirty="0"/>
           </a:p>
@@ -12529,7 +11334,7 @@
           <a:p>
             <a:fld id="{869A38CF-E133-2243-90F7-979D11E866BA}" type="datetime4">
               <a:rPr lang="en-US" smtClean="0"/>
-              <a:t>April 12, 2018</a:t>
+              <a:t>April 23, 2018</a:t>
             </a:fld>
             <a:endParaRPr lang="en-CA" dirty="0"/>
           </a:p>
@@ -12728,7 +11533,7 @@
           <a:p>
             <a:fld id="{869A38CF-E133-2243-90F7-979D11E866BA}" type="datetime4">
               <a:rPr lang="en-US" smtClean="0"/>
-              <a:t>April 12, 2018</a:t>
+              <a:t>April 23, 2018</a:t>
             </a:fld>
             <a:endParaRPr lang="en-CA" dirty="0"/>
           </a:p>
@@ -13324,7 +12129,7 @@
           <a:p>
             <a:fld id="{869A38CF-E133-2243-90F7-979D11E866BA}" type="datetime4">
               <a:rPr lang="en-US" smtClean="0"/>
-              <a:t>April 12, 2018</a:t>
+              <a:t>April 23, 2018</a:t>
             </a:fld>
             <a:endParaRPr lang="en-CA" dirty="0"/>
           </a:p>
@@ -13450,7 +12255,7 @@
           <a:p>
             <a:fld id="{869A38CF-E133-2243-90F7-979D11E866BA}" type="datetime4">
               <a:rPr lang="en-US" smtClean="0"/>
-              <a:t>April 12, 2018</a:t>
+              <a:t>April 23, 2018</a:t>
             </a:fld>
             <a:endParaRPr lang="en-CA" dirty="0"/>
           </a:p>
@@ -13554,7 +12359,7 @@
           <a:p>
             <a:fld id="{869A38CF-E133-2243-90F7-979D11E866BA}" type="datetime4">
               <a:rPr lang="en-US" smtClean="0"/>
-              <a:t>April 12, 2018</a:t>
+              <a:t>April 23, 2018</a:t>
             </a:fld>
             <a:endParaRPr lang="en-CA" dirty="0"/>
           </a:p>
@@ -13780,7 +12585,7 @@
           <a:p>
             <a:fld id="{869A38CF-E133-2243-90F7-979D11E866BA}" type="datetime4">
               <a:rPr lang="en-US" smtClean="0"/>
-              <a:t>April 12, 2018</a:t>
+              <a:t>April 23, 2018</a:t>
             </a:fld>
             <a:endParaRPr lang="en-CA" dirty="0"/>
           </a:p>
@@ -14366,7 +13171,7 @@
             <a:fld id="{869A38CF-E133-2243-90F7-979D11E866BA}" type="datetime4">
               <a:rPr lang="en-US" smtClean="0"/>
               <a:pPr/>
-              <a:t>April 12, 2018</a:t>
+              <a:t>April 23, 2018</a:t>
             </a:fld>
             <a:endParaRPr lang="en-CA" dirty="0"/>
           </a:p>
@@ -14813,7 +13618,7 @@
           <a:p>
             <a:fld id="{869A38CF-E133-2243-90F7-979D11E866BA}" type="datetime4">
               <a:rPr lang="en-US" smtClean="0"/>
-              <a:t>April 12, 2018</a:t>
+              <a:t>April 23, 2018</a:t>
             </a:fld>
             <a:endParaRPr lang="en-CA" dirty="0"/>
           </a:p>
@@ -14990,7 +13795,7 @@
           <a:p>
             <a:fld id="{869A38CF-E133-2243-90F7-979D11E866BA}" type="datetime4">
               <a:rPr lang="en-US" smtClean="0"/>
-              <a:t>April 12, 2018</a:t>
+              <a:t>April 23, 2018</a:t>
             </a:fld>
             <a:endParaRPr lang="en-CA" dirty="0"/>
           </a:p>
@@ -15186,7 +13991,7 @@
           <a:p>
             <a:fld id="{869A38CF-E133-2243-90F7-979D11E866BA}" type="datetime4">
               <a:rPr lang="en-US" smtClean="0"/>
-              <a:t>April 12, 2018</a:t>
+              <a:t>April 23, 2018</a:t>
             </a:fld>
             <a:endParaRPr lang="en-CA" dirty="0"/>
           </a:p>
@@ -15380,7 +14185,7 @@
           <a:p>
             <a:fld id="{869A38CF-E133-2243-90F7-979D11E866BA}" type="datetime4">
               <a:rPr lang="en-US" smtClean="0"/>
-              <a:t>April 12, 2018</a:t>
+              <a:t>April 23, 2018</a:t>
             </a:fld>
             <a:endParaRPr lang="en-CA" dirty="0"/>
           </a:p>
@@ -16253,7 +15058,7 @@
           <a:p>
             <a:fld id="{869A38CF-E133-2243-90F7-979D11E866BA}" type="datetime4">
               <a:rPr lang="en-US" smtClean="0"/>
-              <a:t>April 12, 2018</a:t>
+              <a:t>April 23, 2018</a:t>
             </a:fld>
             <a:endParaRPr lang="en-CA" dirty="0"/>
           </a:p>
@@ -16313,7 +15118,7 @@
         </p:spPr>
         <p:txBody>
           <a:bodyPr>
-            <a:normAutofit/>
+            <a:normAutofit fontScale="92500" lnSpcReduction="10000"/>
           </a:bodyPr>
           <a:lstStyle/>
           <a:p>
@@ -16323,6 +15128,12 @@
             </a:r>
           </a:p>
           <a:p>
+            <a:r>
+              <a:rPr lang="en-US" sz="2800" dirty="0"/>
+              <a:t>Permitted traffic should go through an intermediary</a:t>
+            </a:r>
+          </a:p>
+          <a:p>
             <a:pPr lvl="1"/>
             <a:r>
               <a:rPr lang="en-US" sz="2800" dirty="0"/>
@@ -16348,6 +15159,13 @@
             <a:r>
               <a:rPr lang="en-US" sz="2600" dirty="0"/>
               <a:t>Should be blocked</a:t>
+            </a:r>
+          </a:p>
+          <a:p>
+            <a:pPr lvl="1"/>
+            <a:r>
+              <a:rPr lang="en-US" sz="2800" dirty="0"/>
+              <a:t>UDP:53 (DNS)</a:t>
             </a:r>
           </a:p>
           <a:p>
@@ -16445,7 +15263,7 @@
           <a:p>
             <a:fld id="{869A38CF-E133-2243-90F7-979D11E866BA}" type="datetime4">
               <a:rPr lang="en-US" smtClean="0"/>
-              <a:t>April 12, 2018</a:t>
+              <a:t>April 23, 2018</a:t>
             </a:fld>
             <a:endParaRPr lang="en-CA" dirty="0"/>
           </a:p>
@@ -16645,7 +15463,7 @@
           <a:p>
             <a:fld id="{869A38CF-E133-2243-90F7-979D11E866BA}" type="datetime4">
               <a:rPr lang="en-US" smtClean="0"/>
-              <a:t>April 12, 2018</a:t>
+              <a:t>April 23, 2018</a:t>
             </a:fld>
             <a:endParaRPr lang="en-CA" dirty="0"/>
           </a:p>
@@ -16833,7 +15651,7 @@
           <a:p>
             <a:fld id="{869A38CF-E133-2243-90F7-979D11E866BA}" type="datetime4">
               <a:rPr lang="en-US" smtClean="0"/>
-              <a:t>April 12, 2018</a:t>
+              <a:t>April 23, 2018</a:t>
             </a:fld>
             <a:endParaRPr lang="en-CA" dirty="0"/>
           </a:p>
@@ -17010,7 +15828,7 @@
           <a:p>
             <a:fld id="{869A38CF-E133-2243-90F7-979D11E866BA}" type="datetime4">
               <a:rPr lang="en-US" smtClean="0"/>
-              <a:t>April 12, 2018</a:t>
+              <a:t>April 23, 2018</a:t>
             </a:fld>
             <a:endParaRPr lang="en-CA" dirty="0"/>
           </a:p>
@@ -17215,7 +16033,7 @@
           <a:p>
             <a:fld id="{869A38CF-E133-2243-90F7-979D11E866BA}" type="datetime4">
               <a:rPr lang="en-US" smtClean="0"/>
-              <a:t>April 12, 2018</a:t>
+              <a:t>April 23, 2018</a:t>
             </a:fld>
             <a:endParaRPr lang="en-CA" dirty="0"/>
           </a:p>
@@ -17406,7 +16224,7 @@
           <a:p>
             <a:fld id="{869A38CF-E133-2243-90F7-979D11E866BA}" type="datetime4">
               <a:rPr lang="en-US" smtClean="0"/>
-              <a:t>April 12, 2018</a:t>
+              <a:t>April 23, 2018</a:t>
             </a:fld>
             <a:endParaRPr lang="en-CA" dirty="0"/>
           </a:p>
@@ -17633,7 +16451,7 @@
           <a:p>
             <a:fld id="{869A38CF-E133-2243-90F7-979D11E866BA}" type="datetime4">
               <a:rPr lang="en-US" smtClean="0"/>
-              <a:t>April 12, 2018</a:t>
+              <a:t>April 23, 2018</a:t>
             </a:fld>
             <a:endParaRPr lang="en-CA" dirty="0"/>
           </a:p>
@@ -18444,7 +17262,7 @@
           <a:p>
             <a:fld id="{869A38CF-E133-2243-90F7-979D11E866BA}" type="datetime4">
               <a:rPr lang="en-US" smtClean="0"/>
-              <a:t>April 12, 2018</a:t>
+              <a:t>April 23, 2018</a:t>
             </a:fld>
             <a:endParaRPr lang="en-CA" dirty="0"/>
           </a:p>
@@ -18633,7 +17451,7 @@
           <a:p>
             <a:fld id="{869A38CF-E133-2243-90F7-979D11E866BA}" type="datetime4">
               <a:rPr lang="en-US" smtClean="0"/>
-              <a:t>April 12, 2018</a:t>
+              <a:t>April 23, 2018</a:t>
             </a:fld>
             <a:endParaRPr lang="en-CA" dirty="0"/>
           </a:p>
@@ -19692,7 +18510,7 @@
           <a:p>
             <a:fld id="{869A38CF-E133-2243-90F7-979D11E866BA}" type="datetime4">
               <a:rPr lang="en-US" smtClean="0"/>
-              <a:t>April 12, 2018</a:t>
+              <a:t>April 23, 2018</a:t>
             </a:fld>
             <a:endParaRPr lang="en-CA" dirty="0"/>
           </a:p>
@@ -19922,7 +18740,7 @@
           <a:p>
             <a:fld id="{869A38CF-E133-2243-90F7-979D11E866BA}" type="datetime4">
               <a:rPr lang="en-US" smtClean="0"/>
-              <a:t>April 12, 2018</a:t>
+              <a:t>April 23, 2018</a:t>
             </a:fld>
             <a:endParaRPr lang="en-CA" dirty="0"/>
           </a:p>
@@ -20105,7 +18923,7 @@
           <a:p>
             <a:fld id="{869A38CF-E133-2243-90F7-979D11E866BA}" type="datetime4">
               <a:rPr lang="en-US" smtClean="0"/>
-              <a:t>April 12, 2018</a:t>
+              <a:t>April 23, 2018</a:t>
             </a:fld>
             <a:endParaRPr lang="en-CA" dirty="0"/>
           </a:p>
@@ -20288,7 +19106,7 @@
           <a:p>
             <a:fld id="{869A38CF-E133-2243-90F7-979D11E866BA}" type="datetime4">
               <a:rPr lang="en-US" smtClean="0"/>
-              <a:t>April 12, 2018</a:t>
+              <a:t>April 23, 2018</a:t>
             </a:fld>
             <a:endParaRPr lang="en-CA" dirty="0"/>
           </a:p>
@@ -20471,7 +19289,7 @@
           <a:p>
             <a:fld id="{869A38CF-E133-2243-90F7-979D11E866BA}" type="datetime4">
               <a:rPr lang="en-US" smtClean="0"/>
-              <a:t>April 12, 2018</a:t>
+              <a:t>April 23, 2018</a:t>
             </a:fld>
             <a:endParaRPr lang="en-CA" dirty="0"/>
           </a:p>
@@ -20654,7 +19472,7 @@
           <a:p>
             <a:fld id="{869A38CF-E133-2243-90F7-979D11E866BA}" type="datetime4">
               <a:rPr lang="en-US" smtClean="0"/>
-              <a:t>April 12, 2018</a:t>
+              <a:t>April 23, 2018</a:t>
             </a:fld>
             <a:endParaRPr lang="en-CA" dirty="0"/>
           </a:p>
@@ -21715,18 +20533,18 @@
 </file>
 
 <file path=customXml/item2.xml><?xml version="1.0" encoding="utf-8"?>
+<p:properties xmlns:p="http://schemas.microsoft.com/office/2006/metadata/properties" xmlns:xsi="http://www.w3.org/2001/XMLSchema-instance" xmlns:pc="http://schemas.microsoft.com/office/infopath/2007/PartnerControls">
+  <documentManagement/>
+</p:properties>
+</file>
+
+<file path=customXml/item3.xml><?xml version="1.0" encoding="utf-8"?>
 <?mso-contentType ?>
 <FormTemplates xmlns="http://schemas.microsoft.com/sharepoint/v3/contenttype/forms">
   <Display>DocumentLibraryForm</Display>
   <Edit>DocumentLibraryForm</Edit>
   <New>DocumentLibraryForm</New>
 </FormTemplates>
-</file>
-
-<file path=customXml/item3.xml><?xml version="1.0" encoding="utf-8"?>
-<p:properties xmlns:p="http://schemas.microsoft.com/office/2006/metadata/properties" xmlns:xsi="http://www.w3.org/2001/XMLSchema-instance" xmlns:pc="http://schemas.microsoft.com/office/infopath/2007/PartnerControls">
-  <documentManagement/>
-</p:properties>
 </file>
 
 <file path=customXml/itemProps1.xml><?xml version="1.0" encoding="utf-8"?>
@@ -21748,25 +20566,25 @@
 </file>
 
 <file path=customXml/itemProps2.xml><?xml version="1.0" encoding="utf-8"?>
+<ds:datastoreItem xmlns:ds="http://schemas.openxmlformats.org/officeDocument/2006/customXml" ds:itemID="{0BBB757E-0932-4635-8D18-732DEBB5D1F8}">
+  <ds:schemaRefs>
+    <ds:schemaRef ds:uri="http://purl.org/dc/terms/"/>
+    <ds:schemaRef ds:uri="http://schemas.openxmlformats.org/package/2006/metadata/core-properties"/>
+    <ds:schemaRef ds:uri="3731b75e-6f68-40f4-9d0a-0a5cf2200f93"/>
+    <ds:schemaRef ds:uri="http://schemas.microsoft.com/office/2006/documentManagement/types"/>
+    <ds:schemaRef ds:uri="http://schemas.microsoft.com/office/infopath/2007/PartnerControls"/>
+    <ds:schemaRef ds:uri="http://purl.org/dc/elements/1.1/"/>
+    <ds:schemaRef ds:uri="http://schemas.microsoft.com/office/2006/metadata/properties"/>
+    <ds:schemaRef ds:uri="http://www.w3.org/XML/1998/namespace"/>
+    <ds:schemaRef ds:uri="http://purl.org/dc/dcmitype/"/>
+  </ds:schemaRefs>
+</ds:datastoreItem>
+</file>
+
+<file path=customXml/itemProps3.xml><?xml version="1.0" encoding="utf-8"?>
 <ds:datastoreItem xmlns:ds="http://schemas.openxmlformats.org/officeDocument/2006/customXml" ds:itemID="{C809629B-DAAE-43CD-9923-A162774A4306}">
   <ds:schemaRefs>
     <ds:schemaRef ds:uri="http://schemas.microsoft.com/sharepoint/v3/contenttype/forms"/>
   </ds:schemaRefs>
 </ds:datastoreItem>
-</file>
-
-<file path=customXml/itemProps3.xml><?xml version="1.0" encoding="utf-8"?>
-<ds:datastoreItem xmlns:ds="http://schemas.openxmlformats.org/officeDocument/2006/customXml" ds:itemID="{0BBB757E-0932-4635-8D18-732DEBB5D1F8}">
-  <ds:schemaRefs>
-    <ds:schemaRef ds:uri="http://schemas.microsoft.com/office/2006/documentManagement/types"/>
-    <ds:schemaRef ds:uri="http://schemas.microsoft.com/office/infopath/2007/PartnerControls"/>
-    <ds:schemaRef ds:uri="http://purl.org/dc/elements/1.1/"/>
-    <ds:schemaRef ds:uri="http://schemas.microsoft.com/office/2006/metadata/properties"/>
-    <ds:schemaRef ds:uri="http://purl.org/dc/terms/"/>
-    <ds:schemaRef ds:uri="http://schemas.openxmlformats.org/package/2006/metadata/core-properties"/>
-    <ds:schemaRef ds:uri="3731b75e-6f68-40f4-9d0a-0a5cf2200f93"/>
-    <ds:schemaRef ds:uri="http://www.w3.org/XML/1998/namespace"/>
-    <ds:schemaRef ds:uri="http://purl.org/dc/dcmitype/"/>
-  </ds:schemaRefs>
-</ds:datastoreItem>
 </file>
</xml_diff>